<commit_message>
Add some docs (#10)
</commit_message>
<xml_diff>
--- a/Вашкулатов 12.04.pptx
+++ b/Вашкулатов 12.04.pptx
@@ -210,7 +210,7 @@
           <a:p>
             <a:fld id="{06EA2F6A-6C6A-4F9A-A657-6DE485336090}" type="datetimeFigureOut">
               <a:rPr lang="ru-RU" smtClean="0"/>
-              <a:t>11.04.2024</a:t>
+              <a:t>12.05.2024</a:t>
             </a:fld>
             <a:endParaRPr lang="ru-RU"/>
           </a:p>
@@ -996,7 +996,7 @@
           <a:p>
             <a:fld id="{62C41D10-422A-4030-A4D6-C22849B1D5B0}" type="datetime1">
               <a:rPr lang="ru-RU" smtClean="0"/>
-              <a:t>11.04.2024</a:t>
+              <a:t>12.05.2024</a:t>
             </a:fld>
             <a:endParaRPr lang="ru-RU"/>
           </a:p>
@@ -1066,13 +1066,13 @@
   <p:clrMapOvr>
     <a:masterClrMapping/>
   </p:clrMapOvr>
-  <mc:AlternateContent xmlns:mc="http://schemas.openxmlformats.org/markup-compatibility/2006">
-    <mc:Choice xmlns:p14="http://schemas.microsoft.com/office/powerpoint/2010/main" Requires="p14">
+  <mc:AlternateContent xmlns:mc="http://schemas.openxmlformats.org/markup-compatibility/2006" xmlns:p14="http://schemas.microsoft.com/office/powerpoint/2010/main">
+    <mc:Choice Requires="p14">
       <p:transition>
         <p14:reveal/>
       </p:transition>
     </mc:Choice>
-    <mc:Fallback>
+    <mc:Fallback xmlns="">
       <p:transition>
         <p:fade/>
       </p:transition>
@@ -1206,7 +1206,7 @@
           <a:p>
             <a:fld id="{58F213A7-9D90-40AC-81D0-040E14F3609F}" type="datetime1">
               <a:rPr lang="ru-RU" smtClean="0"/>
-              <a:t>11.04.2024</a:t>
+              <a:t>12.05.2024</a:t>
             </a:fld>
             <a:endParaRPr lang="ru-RU"/>
           </a:p>
@@ -1276,13 +1276,13 @@
   <p:clrMapOvr>
     <a:masterClrMapping/>
   </p:clrMapOvr>
-  <mc:AlternateContent xmlns:mc="http://schemas.openxmlformats.org/markup-compatibility/2006">
-    <mc:Choice xmlns:p14="http://schemas.microsoft.com/office/powerpoint/2010/main" Requires="p14">
+  <mc:AlternateContent xmlns:mc="http://schemas.openxmlformats.org/markup-compatibility/2006" xmlns:p14="http://schemas.microsoft.com/office/powerpoint/2010/main">
+    <mc:Choice Requires="p14">
       <p:transition>
         <p14:reveal/>
       </p:transition>
     </mc:Choice>
-    <mc:Fallback>
+    <mc:Fallback xmlns="">
       <p:transition>
         <p:fade/>
       </p:transition>
@@ -1426,7 +1426,7 @@
           <a:p>
             <a:fld id="{2DBD163E-DF89-4729-A8F3-8F9BF9CF3FA4}" type="datetime1">
               <a:rPr lang="ru-RU" smtClean="0"/>
-              <a:t>11.04.2024</a:t>
+              <a:t>12.05.2024</a:t>
             </a:fld>
             <a:endParaRPr lang="ru-RU"/>
           </a:p>
@@ -1496,13 +1496,13 @@
   <p:clrMapOvr>
     <a:masterClrMapping/>
   </p:clrMapOvr>
-  <mc:AlternateContent xmlns:mc="http://schemas.openxmlformats.org/markup-compatibility/2006">
-    <mc:Choice xmlns:p14="http://schemas.microsoft.com/office/powerpoint/2010/main" Requires="p14">
+  <mc:AlternateContent xmlns:mc="http://schemas.openxmlformats.org/markup-compatibility/2006" xmlns:p14="http://schemas.microsoft.com/office/powerpoint/2010/main">
+    <mc:Choice Requires="p14">
       <p:transition>
         <p14:reveal/>
       </p:transition>
     </mc:Choice>
-    <mc:Fallback>
+    <mc:Fallback xmlns="">
       <p:transition>
         <p:fade/>
       </p:transition>
@@ -1636,7 +1636,7 @@
           <a:p>
             <a:fld id="{123EEFFD-FF24-4AA0-88A5-06D3B8242127}" type="datetime1">
               <a:rPr lang="ru-RU" smtClean="0"/>
-              <a:t>11.04.2024</a:t>
+              <a:t>12.05.2024</a:t>
             </a:fld>
             <a:endParaRPr lang="ru-RU"/>
           </a:p>
@@ -1706,13 +1706,13 @@
   <p:clrMapOvr>
     <a:masterClrMapping/>
   </p:clrMapOvr>
-  <mc:AlternateContent xmlns:mc="http://schemas.openxmlformats.org/markup-compatibility/2006">
-    <mc:Choice xmlns:p14="http://schemas.microsoft.com/office/powerpoint/2010/main" Requires="p14">
+  <mc:AlternateContent xmlns:mc="http://schemas.openxmlformats.org/markup-compatibility/2006" xmlns:p14="http://schemas.microsoft.com/office/powerpoint/2010/main">
+    <mc:Choice Requires="p14">
       <p:transition>
         <p14:reveal/>
       </p:transition>
     </mc:Choice>
-    <mc:Fallback>
+    <mc:Fallback xmlns="">
       <p:transition>
         <p:fade/>
       </p:transition>
@@ -1923,7 +1923,7 @@
           <a:p>
             <a:fld id="{139E04B5-F64C-4F4C-844D-AF6555F0CB7B}" type="datetime1">
               <a:rPr lang="ru-RU" smtClean="0"/>
-              <a:t>11.04.2024</a:t>
+              <a:t>12.05.2024</a:t>
             </a:fld>
             <a:endParaRPr lang="ru-RU"/>
           </a:p>
@@ -1993,13 +1993,13 @@
   <p:clrMapOvr>
     <a:masterClrMapping/>
   </p:clrMapOvr>
-  <mc:AlternateContent xmlns:mc="http://schemas.openxmlformats.org/markup-compatibility/2006">
-    <mc:Choice xmlns:p14="http://schemas.microsoft.com/office/powerpoint/2010/main" Requires="p14">
+  <mc:AlternateContent xmlns:mc="http://schemas.openxmlformats.org/markup-compatibility/2006" xmlns:p14="http://schemas.microsoft.com/office/powerpoint/2010/main">
+    <mc:Choice Requires="p14">
       <p:transition>
         <p14:reveal/>
       </p:transition>
     </mc:Choice>
-    <mc:Fallback>
+    <mc:Fallback xmlns="">
       <p:transition>
         <p:fade/>
       </p:transition>
@@ -2200,7 +2200,7 @@
           <a:p>
             <a:fld id="{FE1CE4C2-B8D6-4E06-9174-BA62B0502D18}" type="datetime1">
               <a:rPr lang="ru-RU" smtClean="0"/>
-              <a:t>11.04.2024</a:t>
+              <a:t>12.05.2024</a:t>
             </a:fld>
             <a:endParaRPr lang="ru-RU"/>
           </a:p>
@@ -2270,13 +2270,13 @@
   <p:clrMapOvr>
     <a:masterClrMapping/>
   </p:clrMapOvr>
-  <mc:AlternateContent xmlns:mc="http://schemas.openxmlformats.org/markup-compatibility/2006">
-    <mc:Choice xmlns:p14="http://schemas.microsoft.com/office/powerpoint/2010/main" Requires="p14">
+  <mc:AlternateContent xmlns:mc="http://schemas.openxmlformats.org/markup-compatibility/2006" xmlns:p14="http://schemas.microsoft.com/office/powerpoint/2010/main">
+    <mc:Choice Requires="p14">
       <p:transition>
         <p14:reveal/>
       </p:transition>
     </mc:Choice>
-    <mc:Fallback>
+    <mc:Fallback xmlns="">
       <p:transition>
         <p:fade/>
       </p:transition>
@@ -2624,7 +2624,7 @@
           <a:p>
             <a:fld id="{078ACEFC-2A5D-4B8B-B596-165BBCFEE40A}" type="datetime1">
               <a:rPr lang="ru-RU" smtClean="0"/>
-              <a:t>11.04.2024</a:t>
+              <a:t>12.05.2024</a:t>
             </a:fld>
             <a:endParaRPr lang="ru-RU"/>
           </a:p>
@@ -2694,13 +2694,13 @@
   <p:clrMapOvr>
     <a:masterClrMapping/>
   </p:clrMapOvr>
-  <mc:AlternateContent xmlns:mc="http://schemas.openxmlformats.org/markup-compatibility/2006">
-    <mc:Choice xmlns:p14="http://schemas.microsoft.com/office/powerpoint/2010/main" Requires="p14">
+  <mc:AlternateContent xmlns:mc="http://schemas.openxmlformats.org/markup-compatibility/2006" xmlns:p14="http://schemas.microsoft.com/office/powerpoint/2010/main">
+    <mc:Choice Requires="p14">
       <p:transition>
         <p14:reveal/>
       </p:transition>
     </mc:Choice>
-    <mc:Fallback>
+    <mc:Fallback xmlns="">
       <p:transition>
         <p:fade/>
       </p:transition>
@@ -2777,7 +2777,7 @@
           <a:p>
             <a:fld id="{76236C0C-4E67-41AE-81AF-B0C572D4F547}" type="datetime1">
               <a:rPr lang="ru-RU" smtClean="0"/>
-              <a:t>11.04.2024</a:t>
+              <a:t>12.05.2024</a:t>
             </a:fld>
             <a:endParaRPr lang="ru-RU"/>
           </a:p>
@@ -2847,13 +2847,13 @@
   <p:clrMapOvr>
     <a:masterClrMapping/>
   </p:clrMapOvr>
-  <mc:AlternateContent xmlns:mc="http://schemas.openxmlformats.org/markup-compatibility/2006">
-    <mc:Choice xmlns:p14="http://schemas.microsoft.com/office/powerpoint/2010/main" Requires="p14">
+  <mc:AlternateContent xmlns:mc="http://schemas.openxmlformats.org/markup-compatibility/2006" xmlns:p14="http://schemas.microsoft.com/office/powerpoint/2010/main">
+    <mc:Choice Requires="p14">
       <p:transition>
         <p14:reveal/>
       </p:transition>
     </mc:Choice>
-    <mc:Fallback>
+    <mc:Fallback xmlns="">
       <p:transition>
         <p:fade/>
       </p:transition>
@@ -2902,7 +2902,7 @@
           <a:p>
             <a:fld id="{8AE932F1-EA51-48A2-8D28-940B374DF011}" type="datetime1">
               <a:rPr lang="ru-RU" smtClean="0"/>
-              <a:t>11.04.2024</a:t>
+              <a:t>12.05.2024</a:t>
             </a:fld>
             <a:endParaRPr lang="ru-RU"/>
           </a:p>
@@ -2972,13 +2972,13 @@
   <p:clrMapOvr>
     <a:masterClrMapping/>
   </p:clrMapOvr>
-  <mc:AlternateContent xmlns:mc="http://schemas.openxmlformats.org/markup-compatibility/2006">
-    <mc:Choice xmlns:p14="http://schemas.microsoft.com/office/powerpoint/2010/main" Requires="p14">
+  <mc:AlternateContent xmlns:mc="http://schemas.openxmlformats.org/markup-compatibility/2006" xmlns:p14="http://schemas.microsoft.com/office/powerpoint/2010/main">
+    <mc:Choice Requires="p14">
       <p:transition>
         <p14:reveal/>
       </p:transition>
     </mc:Choice>
-    <mc:Fallback>
+    <mc:Fallback xmlns="">
       <p:transition>
         <p:fade/>
       </p:transition>
@@ -3225,7 +3225,7 @@
           <a:p>
             <a:fld id="{753C7966-3936-4F95-AAB3-CA9CAA1DE2C8}" type="datetime1">
               <a:rPr lang="ru-RU" smtClean="0"/>
-              <a:t>11.04.2024</a:t>
+              <a:t>12.05.2024</a:t>
             </a:fld>
             <a:endParaRPr lang="ru-RU"/>
           </a:p>
@@ -3295,13 +3295,13 @@
   <p:clrMapOvr>
     <a:masterClrMapping/>
   </p:clrMapOvr>
-  <mc:AlternateContent xmlns:mc="http://schemas.openxmlformats.org/markup-compatibility/2006">
-    <mc:Choice xmlns:p14="http://schemas.microsoft.com/office/powerpoint/2010/main" Requires="p14">
+  <mc:AlternateContent xmlns:mc="http://schemas.openxmlformats.org/markup-compatibility/2006" xmlns:p14="http://schemas.microsoft.com/office/powerpoint/2010/main">
+    <mc:Choice Requires="p14">
       <p:transition>
         <p14:reveal/>
       </p:transition>
     </mc:Choice>
-    <mc:Fallback>
+    <mc:Fallback xmlns="">
       <p:transition>
         <p:fade/>
       </p:transition>
@@ -3528,7 +3528,7 @@
           <a:p>
             <a:fld id="{B8CF1FB5-E301-4191-AD2A-1091E4B920C4}" type="datetime1">
               <a:rPr lang="ru-RU" smtClean="0"/>
-              <a:t>11.04.2024</a:t>
+              <a:t>12.05.2024</a:t>
             </a:fld>
             <a:endParaRPr lang="ru-RU"/>
           </a:p>
@@ -3598,13 +3598,13 @@
   <p:clrMapOvr>
     <a:masterClrMapping/>
   </p:clrMapOvr>
-  <mc:AlternateContent xmlns:mc="http://schemas.openxmlformats.org/markup-compatibility/2006">
-    <mc:Choice xmlns:p14="http://schemas.microsoft.com/office/powerpoint/2010/main" Requires="p14">
+  <mc:AlternateContent xmlns:mc="http://schemas.openxmlformats.org/markup-compatibility/2006" xmlns:p14="http://schemas.microsoft.com/office/powerpoint/2010/main">
+    <mc:Choice Requires="p14">
       <p:transition>
         <p14:reveal/>
       </p:transition>
     </mc:Choice>
-    <mc:Fallback>
+    <mc:Fallback xmlns="">
       <p:transition>
         <p:fade/>
       </p:transition>
@@ -3817,7 +3817,7 @@
           <a:p>
             <a:fld id="{40A56BA6-386D-4A0A-B1E5-CA2E984204CF}" type="datetime1">
               <a:rPr lang="ru-RU" smtClean="0"/>
-              <a:t>11.04.2024</a:t>
+              <a:t>12.05.2024</a:t>
             </a:fld>
             <a:endParaRPr lang="ru-RU"/>
           </a:p>
@@ -3934,13 +3934,13 @@
     <p:sldLayoutId id="2147483670" r:id="rId10"/>
     <p:sldLayoutId id="2147483671" r:id="rId11"/>
   </p:sldLayoutIdLst>
-  <mc:AlternateContent xmlns:mc="http://schemas.openxmlformats.org/markup-compatibility/2006">
-    <mc:Choice xmlns:p14="http://schemas.microsoft.com/office/powerpoint/2010/main" Requires="p14">
+  <mc:AlternateContent xmlns:mc="http://schemas.openxmlformats.org/markup-compatibility/2006" xmlns:p14="http://schemas.microsoft.com/office/powerpoint/2010/main">
+    <mc:Choice Requires="p14">
       <p:transition>
         <p14:reveal/>
       </p:transition>
     </mc:Choice>
-    <mc:Fallback>
+    <mc:Fallback xmlns="">
       <p:transition>
         <p:fade/>
       </p:transition>
@@ -4628,13 +4628,13 @@
   <p:clrMapOvr>
     <a:masterClrMapping/>
   </p:clrMapOvr>
-  <mc:AlternateContent xmlns:mc="http://schemas.openxmlformats.org/markup-compatibility/2006">
-    <mc:Choice xmlns:p14="http://schemas.microsoft.com/office/powerpoint/2010/main" Requires="p14">
+  <mc:AlternateContent xmlns:mc="http://schemas.openxmlformats.org/markup-compatibility/2006" xmlns:p14="http://schemas.microsoft.com/office/powerpoint/2010/main">
+    <mc:Choice Requires="p14">
       <p:transition>
         <p14:reveal/>
       </p:transition>
     </mc:Choice>
-    <mc:Fallback>
+    <mc:Fallback xmlns="">
       <p:transition>
         <p:fade/>
       </p:transition>
@@ -4856,13 +4856,13 @@
   <p:clrMapOvr>
     <a:masterClrMapping/>
   </p:clrMapOvr>
-  <mc:AlternateContent xmlns:mc="http://schemas.openxmlformats.org/markup-compatibility/2006">
-    <mc:Choice xmlns:p14="http://schemas.microsoft.com/office/powerpoint/2010/main" Requires="p14">
+  <mc:AlternateContent xmlns:mc="http://schemas.openxmlformats.org/markup-compatibility/2006" xmlns:p14="http://schemas.microsoft.com/office/powerpoint/2010/main">
+    <mc:Choice Requires="p14">
       <p:transition>
         <p14:reveal/>
       </p:transition>
     </mc:Choice>
-    <mc:Fallback>
+    <mc:Fallback xmlns="">
       <p:transition>
         <p:fade/>
       </p:transition>
@@ -5230,13 +5230,13 @@
   <p:clrMapOvr>
     <a:masterClrMapping/>
   </p:clrMapOvr>
-  <mc:AlternateContent xmlns:mc="http://schemas.openxmlformats.org/markup-compatibility/2006">
-    <mc:Choice xmlns:p14="http://schemas.microsoft.com/office/powerpoint/2010/main" Requires="p14">
+  <mc:AlternateContent xmlns:mc="http://schemas.openxmlformats.org/markup-compatibility/2006" xmlns:p14="http://schemas.microsoft.com/office/powerpoint/2010/main">
+    <mc:Choice Requires="p14">
       <p:transition>
         <p14:reveal/>
       </p:transition>
     </mc:Choice>
-    <mc:Fallback>
+    <mc:Fallback xmlns="">
       <p:transition>
         <p:fade/>
       </p:transition>
@@ -5411,13 +5411,13 @@
   <p:clrMapOvr>
     <a:masterClrMapping/>
   </p:clrMapOvr>
-  <mc:AlternateContent xmlns:mc="http://schemas.openxmlformats.org/markup-compatibility/2006">
-    <mc:Choice xmlns:p14="http://schemas.microsoft.com/office/powerpoint/2010/main" Requires="p14">
+  <mc:AlternateContent xmlns:mc="http://schemas.openxmlformats.org/markup-compatibility/2006" xmlns:p14="http://schemas.microsoft.com/office/powerpoint/2010/main">
+    <mc:Choice Requires="p14">
       <p:transition>
         <p14:reveal/>
       </p:transition>
     </mc:Choice>
-    <mc:Fallback>
+    <mc:Fallback xmlns="">
       <p:transition>
         <p:fade/>
       </p:transition>
@@ -5491,9 +5491,9 @@
           <p:nvPr/>
         </p:nvCxnSpPr>
         <p:spPr>
-          <a:xfrm>
-            <a:off x="7977559" y="1522709"/>
-            <a:ext cx="27582" cy="4764323"/>
+          <a:xfrm flipH="1">
+            <a:off x="7320212" y="1522709"/>
+            <a:ext cx="11171" cy="6173491"/>
           </a:xfrm>
           <a:prstGeom prst="line">
             <a:avLst/>
@@ -5525,8 +5525,8 @@
         </p:nvSpPr>
         <p:spPr>
           <a:xfrm>
-            <a:off x="1739017" y="1091231"/>
-            <a:ext cx="1575326" cy="431477"/>
+            <a:off x="1918729" y="1084697"/>
+            <a:ext cx="1244320" cy="431477"/>
           </a:xfrm>
           <a:prstGeom prst="rect">
             <a:avLst/>
@@ -5588,9 +5588,9 @@
           <p:nvPr/>
         </p:nvCxnSpPr>
         <p:spPr>
-          <a:xfrm>
-            <a:off x="2526680" y="1522709"/>
-            <a:ext cx="1078" cy="4764323"/>
+          <a:xfrm flipH="1">
+            <a:off x="2527759" y="1516174"/>
+            <a:ext cx="13130" cy="6235906"/>
           </a:xfrm>
           <a:prstGeom prst="line">
             <a:avLst/>
@@ -5622,8 +5622,8 @@
         </p:nvSpPr>
         <p:spPr>
           <a:xfrm>
-            <a:off x="3568942" y="1091231"/>
-            <a:ext cx="1575326" cy="431477"/>
+            <a:off x="3504515" y="1079489"/>
+            <a:ext cx="1211279" cy="431477"/>
           </a:xfrm>
           <a:prstGeom prst="rect">
             <a:avLst/>
@@ -5679,13 +5679,15 @@
       <p:cxnSp>
         <p:nvCxnSpPr>
           <p:cNvPr id="7" name="Прямая соединительная линия 6"/>
-          <p:cNvCxnSpPr/>
+          <p:cNvCxnSpPr>
+            <a:stCxn id="6" idx="2"/>
+          </p:cNvCxnSpPr>
           <p:nvPr/>
         </p:nvCxnSpPr>
         <p:spPr>
-          <a:xfrm flipH="1">
-            <a:off x="4364926" y="1522709"/>
-            <a:ext cx="31458" cy="4764323"/>
+          <a:xfrm>
+            <a:off x="4110155" y="1510966"/>
+            <a:ext cx="4645" cy="6185234"/>
           </a:xfrm>
           <a:prstGeom prst="line">
             <a:avLst/>
@@ -5718,7 +5720,7 @@
         <p:spPr>
           <a:xfrm>
             <a:off x="2429301" y="1712243"/>
-            <a:ext cx="196916" cy="3983699"/>
+            <a:ext cx="196916" cy="5400286"/>
           </a:xfrm>
           <a:prstGeom prst="rect">
             <a:avLst/>
@@ -5765,8 +5767,8 @@
         </p:nvSpPr>
         <p:spPr>
           <a:xfrm>
-            <a:off x="4330629" y="1712243"/>
-            <a:ext cx="123355" cy="1422398"/>
+            <a:off x="4024967" y="1665012"/>
+            <a:ext cx="168598" cy="2010875"/>
           </a:xfrm>
           <a:prstGeom prst="rect">
             <a:avLst/>
@@ -5815,8 +5817,8 @@
         </p:nvCxnSpPr>
         <p:spPr>
           <a:xfrm>
-            <a:off x="2527758" y="1712243"/>
-            <a:ext cx="1704415" cy="0"/>
+            <a:off x="2527759" y="1712243"/>
+            <a:ext cx="1477313" cy="0"/>
           </a:xfrm>
           <a:prstGeom prst="straightConnector1">
             <a:avLst/>
@@ -5848,7 +5850,7 @@
         </p:nvSpPr>
         <p:spPr>
           <a:xfrm>
-            <a:off x="2996800" y="1691554"/>
+            <a:off x="2933857" y="1731547"/>
             <a:ext cx="864788" cy="314584"/>
           </a:xfrm>
           <a:prstGeom prst="rect">
@@ -5882,8 +5884,8 @@
         </p:nvSpPr>
         <p:spPr>
           <a:xfrm>
-            <a:off x="5356391" y="1091231"/>
-            <a:ext cx="1575326" cy="431477"/>
+            <a:off x="5095953" y="1091231"/>
+            <a:ext cx="1176830" cy="431477"/>
           </a:xfrm>
           <a:prstGeom prst="rect">
             <a:avLst/>
@@ -5925,16 +5927,25 @@
                 </a:solidFill>
                 <a:latin typeface="Bahnschrift Light Condensed" panose="020B0502040204020203" pitchFamily="34" charset="0"/>
               </a:rPr>
-              <a:t>Сервис </a:t>
-            </a:r>
-            <a:r>
-              <a:rPr lang="en-US" sz="1200" dirty="0" smtClean="0">
+              <a:t>Сервис</a:t>
+            </a:r>
+            <a:r>
+              <a:rPr lang="en-US" sz="1200" dirty="0">
                 <a:solidFill>
                   <a:sysClr val="windowText" lastClr="000000"/>
                 </a:solidFill>
                 <a:latin typeface="Bahnschrift Light Condensed" panose="020B0502040204020203" pitchFamily="34" charset="0"/>
               </a:rPr>
-              <a:t>solution</a:t>
+              <a:t> </a:t>
+            </a:r>
+            <a:r>
+              <a:rPr lang="en-US" sz="1200" dirty="0" err="1" smtClean="0">
+                <a:solidFill>
+                  <a:sysClr val="windowText" lastClr="000000"/>
+                </a:solidFill>
+                <a:latin typeface="Bahnschrift Light Condensed" panose="020B0502040204020203" pitchFamily="34" charset="0"/>
+              </a:rPr>
+              <a:t>api</a:t>
             </a:r>
             <a:endParaRPr lang="ru-RU" sz="1200" dirty="0">
               <a:solidFill>
@@ -5954,9 +5965,9 @@
           <p:nvPr/>
         </p:nvCxnSpPr>
         <p:spPr>
-          <a:xfrm flipH="1">
-            <a:off x="6126331" y="1522709"/>
-            <a:ext cx="17723" cy="4764323"/>
+          <a:xfrm>
+            <a:off x="5684368" y="1522708"/>
+            <a:ext cx="152" cy="6173492"/>
           </a:xfrm>
           <a:prstGeom prst="line">
             <a:avLst/>
@@ -5988,8 +5999,8 @@
         </p:nvSpPr>
         <p:spPr>
           <a:xfrm>
-            <a:off x="6044519" y="1712243"/>
-            <a:ext cx="196916" cy="1422398"/>
+            <a:off x="5595466" y="1642698"/>
+            <a:ext cx="196916" cy="1941749"/>
           </a:xfrm>
           <a:prstGeom prst="rect">
             <a:avLst/>
@@ -6036,8 +6047,8 @@
         </p:nvCxnSpPr>
         <p:spPr>
           <a:xfrm flipV="1">
-            <a:off x="4452766" y="1712243"/>
-            <a:ext cx="1556025" cy="5273"/>
+            <a:off x="4229488" y="1731547"/>
+            <a:ext cx="1285122" cy="734"/>
           </a:xfrm>
           <a:prstGeom prst="straightConnector1">
             <a:avLst/>
@@ -6069,8 +6080,8 @@
         </p:nvSpPr>
         <p:spPr>
           <a:xfrm>
-            <a:off x="4589248" y="1732280"/>
-            <a:ext cx="1357892" cy="524307"/>
+            <a:off x="4300733" y="1756517"/>
+            <a:ext cx="1128611" cy="461665"/>
           </a:xfrm>
           <a:prstGeom prst="rect">
             <a:avLst/>
@@ -6093,13 +6104,19 @@
               <a:rPr lang="en-US" sz="1200" dirty="0" smtClean="0">
                 <a:latin typeface="Bahnschrift Light Condensed" panose="020B0502040204020203" pitchFamily="34" charset="0"/>
               </a:rPr>
-              <a:t>id</a:t>
+              <a:t>ID</a:t>
             </a:r>
             <a:r>
               <a:rPr lang="ru-RU" sz="1200" dirty="0" smtClean="0">
                 <a:latin typeface="Bahnschrift Light Condensed" panose="020B0502040204020203" pitchFamily="34" charset="0"/>
               </a:rPr>
-              <a:t> задачи</a:t>
+              <a:t> </a:t>
+            </a:r>
+            <a:r>
+              <a:rPr lang="ru-RU" sz="1200" dirty="0" smtClean="0">
+                <a:latin typeface="Bahnschrift Light Condensed" panose="020B0502040204020203" pitchFamily="34" charset="0"/>
+              </a:rPr>
+              <a:t>задачи</a:t>
             </a:r>
             <a:endParaRPr lang="ru-RU" sz="1200" dirty="0">
               <a:latin typeface="Bahnschrift Light Condensed" panose="020B0502040204020203" pitchFamily="34" charset="0"/>
@@ -6115,8 +6132,8 @@
         </p:nvSpPr>
         <p:spPr>
           <a:xfrm>
-            <a:off x="7180786" y="1091231"/>
-            <a:ext cx="1575326" cy="431477"/>
+            <a:off x="6838774" y="1079086"/>
+            <a:ext cx="1040381" cy="431477"/>
           </a:xfrm>
           <a:prstGeom prst="rect">
             <a:avLst/>
@@ -6158,16 +6175,7 @@
                 </a:solidFill>
                 <a:latin typeface="Bahnschrift Light Condensed" panose="020B0502040204020203" pitchFamily="34" charset="0"/>
               </a:rPr>
-              <a:t>Сервис </a:t>
-            </a:r>
-            <a:r>
-              <a:rPr lang="en-US" sz="1200" dirty="0" smtClean="0">
-                <a:solidFill>
-                  <a:sysClr val="windowText" lastClr="000000"/>
-                </a:solidFill>
-                <a:latin typeface="Bahnschrift Light Condensed" panose="020B0502040204020203" pitchFamily="34" charset="0"/>
-              </a:rPr>
-              <a:t>task</a:t>
+              <a:t>БД</a:t>
             </a:r>
             <a:endParaRPr lang="ru-RU" sz="1200" dirty="0">
               <a:solidFill>
@@ -6186,7 +6194,7 @@
         </p:nvSpPr>
         <p:spPr>
           <a:xfrm>
-            <a:off x="7868914" y="1712243"/>
+            <a:off x="7246716" y="1653202"/>
             <a:ext cx="196916" cy="668293"/>
           </a:xfrm>
           <a:prstGeom prst="rect">
@@ -6234,8 +6242,8 @@
         </p:nvCxnSpPr>
         <p:spPr>
           <a:xfrm flipV="1">
-            <a:off x="6277162" y="1712243"/>
-            <a:ext cx="1556025" cy="5273"/>
+            <a:off x="5802523" y="1744168"/>
+            <a:ext cx="1417237" cy="8853"/>
           </a:xfrm>
           <a:prstGeom prst="straightConnector1">
             <a:avLst/>
@@ -6261,14 +6269,14 @@
       </p:cxnSp>
       <p:sp>
         <p:nvSpPr>
-          <p:cNvPr id="23" name="TextBox 22"/>
+          <p:cNvPr id="32" name="TextBox 31"/>
           <p:cNvSpPr txBox="1"/>
           <p:nvPr/>
         </p:nvSpPr>
         <p:spPr>
           <a:xfrm>
-            <a:off x="6631321" y="1712243"/>
-            <a:ext cx="1025040" cy="314584"/>
+            <a:off x="6065695" y="2248243"/>
+            <a:ext cx="1236229" cy="314584"/>
           </a:xfrm>
           <a:prstGeom prst="rect">
             <a:avLst/>
@@ -6282,16 +6290,22 @@
           <a:lstStyle/>
           <a:p>
             <a:r>
+              <a:rPr lang="ru-RU" sz="1200" dirty="0" smtClean="0">
+                <a:latin typeface="Bahnschrift Light Condensed" panose="020B0502040204020203" pitchFamily="34" charset="0"/>
+              </a:rPr>
+              <a:t>Задача</a:t>
+            </a:r>
+            <a:r>
               <a:rPr lang="en-US" sz="1200" dirty="0" smtClean="0">
                 <a:latin typeface="Bahnschrift Light Condensed" panose="020B0502040204020203" pitchFamily="34" charset="0"/>
               </a:rPr>
-              <a:t>Id</a:t>
+              <a:t>, </a:t>
             </a:r>
             <a:r>
               <a:rPr lang="ru-RU" sz="1200" dirty="0" smtClean="0">
                 <a:latin typeface="Bahnschrift Light Condensed" panose="020B0502040204020203" pitchFamily="34" charset="0"/>
               </a:rPr>
-              <a:t> задачи</a:t>
+              <a:t>тесты</a:t>
             </a:r>
             <a:endParaRPr lang="ru-RU" sz="1200" dirty="0">
               <a:latin typeface="Bahnschrift Light Condensed" panose="020B0502040204020203" pitchFamily="34" charset="0"/>
@@ -6301,21 +6315,20 @@
       </p:sp>
       <p:cxnSp>
         <p:nvCxnSpPr>
-          <p:cNvPr id="28" name="Прямая со стрелкой 27"/>
+          <p:cNvPr id="33" name="Прямая соединительная линия 32"/>
           <p:cNvCxnSpPr/>
           <p:nvPr/>
         </p:nvCxnSpPr>
         <p:spPr>
           <a:xfrm flipH="1">
-            <a:off x="6277162" y="2256587"/>
-            <a:ext cx="1591752" cy="0"/>
-          </a:xfrm>
-          <a:prstGeom prst="straightConnector1">
+            <a:off x="8549640" y="1510031"/>
+            <a:ext cx="20852" cy="6186169"/>
+          </a:xfrm>
+          <a:prstGeom prst="line">
             <a:avLst/>
           </a:prstGeom>
-          <a:ln w="9525">
-            <a:prstDash val="dash"/>
-            <a:tailEnd type="triangle"/>
+          <a:ln w="15875">
+            <a:prstDash val="sysDash"/>
           </a:ln>
         </p:spPr>
         <p:style>
@@ -6335,93 +6348,14 @@
       </p:cxnSp>
       <p:sp>
         <p:nvSpPr>
-          <p:cNvPr id="32" name="TextBox 31"/>
-          <p:cNvSpPr txBox="1"/>
-          <p:nvPr/>
-        </p:nvSpPr>
-        <p:spPr>
-          <a:xfrm>
-            <a:off x="6540071" y="2247148"/>
-            <a:ext cx="1236229" cy="314584"/>
-          </a:xfrm>
-          <a:prstGeom prst="rect">
-            <a:avLst/>
-          </a:prstGeom>
-          <a:noFill/>
-        </p:spPr>
-        <p:txBody>
-          <a:bodyPr wrap="square" rtlCol="0">
-            <a:spAutoFit/>
-          </a:bodyPr>
-          <a:lstStyle/>
-          <a:p>
-            <a:r>
-              <a:rPr lang="ru-RU" sz="1200" dirty="0" smtClean="0">
-                <a:latin typeface="Bahnschrift Light Condensed" panose="020B0502040204020203" pitchFamily="34" charset="0"/>
-              </a:rPr>
-              <a:t>Задача</a:t>
-            </a:r>
-            <a:r>
-              <a:rPr lang="en-US" sz="1200" dirty="0" smtClean="0">
-                <a:latin typeface="Bahnschrift Light Condensed" panose="020B0502040204020203" pitchFamily="34" charset="0"/>
-              </a:rPr>
-              <a:t>, </a:t>
-            </a:r>
-            <a:r>
-              <a:rPr lang="ru-RU" sz="1200" dirty="0" smtClean="0">
-                <a:latin typeface="Bahnschrift Light Condensed" panose="020B0502040204020203" pitchFamily="34" charset="0"/>
-              </a:rPr>
-              <a:t>тесты</a:t>
-            </a:r>
-            <a:endParaRPr lang="ru-RU" sz="1200" dirty="0">
-              <a:latin typeface="Bahnschrift Light Condensed" panose="020B0502040204020203" pitchFamily="34" charset="0"/>
-            </a:endParaRPr>
-          </a:p>
-        </p:txBody>
-      </p:sp>
-      <p:cxnSp>
-        <p:nvCxnSpPr>
-          <p:cNvPr id="33" name="Прямая соединительная линия 32"/>
-          <p:cNvCxnSpPr/>
-          <p:nvPr/>
-        </p:nvCxnSpPr>
-        <p:spPr>
-          <a:xfrm>
-            <a:off x="9820172" y="1516127"/>
-            <a:ext cx="2023" cy="4770905"/>
-          </a:xfrm>
-          <a:prstGeom prst="line">
-            <a:avLst/>
-          </a:prstGeom>
-          <a:ln w="15875">
-            <a:prstDash val="sysDash"/>
-          </a:ln>
-        </p:spPr>
-        <p:style>
-          <a:lnRef idx="1">
-            <a:schemeClr val="dk1"/>
-          </a:lnRef>
-          <a:fillRef idx="0">
-            <a:schemeClr val="dk1"/>
-          </a:fillRef>
-          <a:effectRef idx="0">
-            <a:schemeClr val="dk1"/>
-          </a:effectRef>
-          <a:fontRef idx="minor">
-            <a:schemeClr val="tx1"/>
-          </a:fontRef>
-        </p:style>
-      </p:cxnSp>
-      <p:sp>
-        <p:nvSpPr>
           <p:cNvPr id="34" name="Прямоугольник 33"/>
           <p:cNvSpPr/>
           <p:nvPr/>
         </p:nvSpPr>
         <p:spPr>
           <a:xfrm>
-            <a:off x="9023400" y="1084650"/>
-            <a:ext cx="1575326" cy="431477"/>
+            <a:off x="8037214" y="1085134"/>
+            <a:ext cx="1088966" cy="431477"/>
           </a:xfrm>
           <a:prstGeom prst="rect">
             <a:avLst/>
@@ -6500,8 +6434,8 @@
         </p:nvSpPr>
         <p:spPr>
           <a:xfrm>
-            <a:off x="9732919" y="2782407"/>
-            <a:ext cx="196916" cy="2111602"/>
+            <a:off x="8472034" y="3410542"/>
+            <a:ext cx="196916" cy="2045378"/>
           </a:xfrm>
           <a:prstGeom prst="rect">
             <a:avLst/>
@@ -6540,157 +6474,16 @@
           </a:p>
         </p:txBody>
       </p:sp>
-      <p:cxnSp>
-        <p:nvCxnSpPr>
-          <p:cNvPr id="36" name="Прямая со стрелкой 35"/>
-          <p:cNvCxnSpPr/>
-          <p:nvPr/>
-        </p:nvCxnSpPr>
-        <p:spPr>
-          <a:xfrm>
-            <a:off x="6296597" y="2750716"/>
-            <a:ext cx="3417086" cy="0"/>
-          </a:xfrm>
-          <a:prstGeom prst="straightConnector1">
-            <a:avLst/>
-          </a:prstGeom>
-          <a:ln>
-            <a:tailEnd type="triangle"/>
-          </a:ln>
-        </p:spPr>
-        <p:style>
-          <a:lnRef idx="1">
-            <a:schemeClr val="dk1"/>
-          </a:lnRef>
-          <a:fillRef idx="0">
-            <a:schemeClr val="dk1"/>
-          </a:fillRef>
-          <a:effectRef idx="0">
-            <a:schemeClr val="dk1"/>
-          </a:effectRef>
-          <a:fontRef idx="minor">
-            <a:schemeClr val="tx1"/>
-          </a:fontRef>
-        </p:style>
-      </p:cxnSp>
-      <p:sp>
-        <p:nvSpPr>
-          <p:cNvPr id="37" name="TextBox 36"/>
-          <p:cNvSpPr txBox="1"/>
-          <p:nvPr/>
-        </p:nvSpPr>
-        <p:spPr>
-          <a:xfrm>
-            <a:off x="8005140" y="2782407"/>
-            <a:ext cx="1498920" cy="314584"/>
-          </a:xfrm>
-          <a:prstGeom prst="rect">
-            <a:avLst/>
-          </a:prstGeom>
-          <a:noFill/>
-        </p:spPr>
-        <p:txBody>
-          <a:bodyPr wrap="square" rtlCol="0">
-            <a:spAutoFit/>
-          </a:bodyPr>
-          <a:lstStyle/>
-          <a:p>
-            <a:r>
-              <a:rPr lang="ru-RU" sz="1200" dirty="0" smtClean="0">
-                <a:latin typeface="Bahnschrift Light Condensed" panose="020B0502040204020203" pitchFamily="34" charset="0"/>
-              </a:rPr>
-              <a:t>Код, входные данные</a:t>
-            </a:r>
-            <a:endParaRPr lang="ru-RU" sz="1200" dirty="0">
-              <a:latin typeface="Bahnschrift Light Condensed" panose="020B0502040204020203" pitchFamily="34" charset="0"/>
-            </a:endParaRPr>
-          </a:p>
-        </p:txBody>
-      </p:sp>
-      <p:cxnSp>
-        <p:nvCxnSpPr>
-          <p:cNvPr id="40" name="Прямая со стрелкой 39"/>
-          <p:cNvCxnSpPr/>
-          <p:nvPr/>
-        </p:nvCxnSpPr>
-        <p:spPr>
-          <a:xfrm flipH="1">
-            <a:off x="4500563" y="3096992"/>
-            <a:ext cx="1508229" cy="0"/>
-          </a:xfrm>
-          <a:prstGeom prst="straightConnector1">
-            <a:avLst/>
-          </a:prstGeom>
-          <a:ln w="9525">
-            <a:prstDash val="dash"/>
-            <a:tailEnd type="triangle"/>
-          </a:ln>
-        </p:spPr>
-        <p:style>
-          <a:lnRef idx="1">
-            <a:schemeClr val="dk1"/>
-          </a:lnRef>
-          <a:fillRef idx="0">
-            <a:schemeClr val="dk1"/>
-          </a:fillRef>
-          <a:effectRef idx="0">
-            <a:schemeClr val="dk1"/>
-          </a:effectRef>
-          <a:fontRef idx="minor">
-            <a:schemeClr val="tx1"/>
-          </a:fontRef>
-        </p:style>
-      </p:cxnSp>
-      <p:sp>
-        <p:nvSpPr>
-          <p:cNvPr id="42" name="TextBox 41"/>
-          <p:cNvSpPr txBox="1"/>
-          <p:nvPr/>
-        </p:nvSpPr>
-        <p:spPr>
-          <a:xfrm>
-            <a:off x="4819653" y="3096992"/>
-            <a:ext cx="1025040" cy="314584"/>
-          </a:xfrm>
-          <a:prstGeom prst="rect">
-            <a:avLst/>
-          </a:prstGeom>
-          <a:noFill/>
-        </p:spPr>
-        <p:txBody>
-          <a:bodyPr wrap="square" rtlCol="0">
-            <a:spAutoFit/>
-          </a:bodyPr>
-          <a:lstStyle/>
-          <a:p>
-            <a:r>
-              <a:rPr lang="en-US" sz="1200" dirty="0" smtClean="0">
-                <a:latin typeface="Bahnschrift Light Condensed" panose="020B0502040204020203" pitchFamily="34" charset="0"/>
-              </a:rPr>
-              <a:t>Id</a:t>
-            </a:r>
-            <a:r>
-              <a:rPr lang="ru-RU" sz="1200" dirty="0" smtClean="0">
-                <a:latin typeface="Bahnschrift Light Condensed" panose="020B0502040204020203" pitchFamily="34" charset="0"/>
-              </a:rPr>
-              <a:t> решения</a:t>
-            </a:r>
-            <a:endParaRPr lang="ru-RU" sz="1200" dirty="0">
-              <a:latin typeface="Bahnschrift Light Condensed" panose="020B0502040204020203" pitchFamily="34" charset="0"/>
-            </a:endParaRPr>
-          </a:p>
-        </p:txBody>
-      </p:sp>
-      <p:sp>
-        <p:nvSpPr>
-          <p:cNvPr id="46" name="Прямоугольник 45"/>
+      <p:sp>
+        <p:nvSpPr>
+          <p:cNvPr id="50" name="Прямоугольник 49"/>
           <p:cNvSpPr/>
           <p:nvPr/>
         </p:nvSpPr>
         <p:spPr>
           <a:xfrm>
-            <a:off x="6051065" y="4691964"/>
-            <a:ext cx="196916" cy="197873"/>
+            <a:off x="5593865" y="3960675"/>
+            <a:ext cx="196916" cy="677366"/>
           </a:xfrm>
           <a:prstGeom prst="rect">
             <a:avLst/>
@@ -6729,84 +6522,16 @@
           </a:p>
         </p:txBody>
       </p:sp>
-      <p:cxnSp>
-        <p:nvCxnSpPr>
-          <p:cNvPr id="47" name="Прямая со стрелкой 46"/>
-          <p:cNvCxnSpPr/>
-          <p:nvPr/>
-        </p:nvCxnSpPr>
-        <p:spPr>
-          <a:xfrm flipH="1" flipV="1">
-            <a:off x="6261594" y="4790900"/>
-            <a:ext cx="3417086" cy="8772"/>
-          </a:xfrm>
-          <a:prstGeom prst="straightConnector1">
-            <a:avLst/>
-          </a:prstGeom>
-          <a:ln w="9525">
-            <a:prstDash val="dash"/>
-            <a:tailEnd type="triangle"/>
-          </a:ln>
-        </p:spPr>
-        <p:style>
-          <a:lnRef idx="1">
-            <a:schemeClr val="dk1"/>
-          </a:lnRef>
-          <a:fillRef idx="0">
-            <a:schemeClr val="dk1"/>
-          </a:fillRef>
-          <a:effectRef idx="0">
-            <a:schemeClr val="dk1"/>
-          </a:effectRef>
-          <a:fontRef idx="minor">
-            <a:schemeClr val="tx1"/>
-          </a:fontRef>
-        </p:style>
-      </p:cxnSp>
-      <p:sp>
-        <p:nvSpPr>
-          <p:cNvPr id="49" name="TextBox 48"/>
-          <p:cNvSpPr txBox="1"/>
-          <p:nvPr/>
-        </p:nvSpPr>
-        <p:spPr>
-          <a:xfrm>
-            <a:off x="6443415" y="4447661"/>
-            <a:ext cx="1698623" cy="314584"/>
-          </a:xfrm>
-          <a:prstGeom prst="rect">
-            <a:avLst/>
-          </a:prstGeom>
-          <a:noFill/>
-        </p:spPr>
-        <p:txBody>
-          <a:bodyPr wrap="square" rtlCol="0">
-            <a:spAutoFit/>
-          </a:bodyPr>
-          <a:lstStyle/>
-          <a:p>
-            <a:r>
-              <a:rPr lang="ru-RU" sz="1200" dirty="0" smtClean="0">
-                <a:latin typeface="Bahnschrift Light Condensed" panose="020B0502040204020203" pitchFamily="34" charset="0"/>
-              </a:rPr>
-              <a:t>Результат выполнения</a:t>
-            </a:r>
-            <a:endParaRPr lang="ru-RU" sz="1200" dirty="0">
-              <a:latin typeface="Bahnschrift Light Condensed" panose="020B0502040204020203" pitchFamily="34" charset="0"/>
-            </a:endParaRPr>
-          </a:p>
-        </p:txBody>
-      </p:sp>
-      <p:sp>
-        <p:nvSpPr>
-          <p:cNvPr id="50" name="Прямоугольник 49"/>
+      <p:sp>
+        <p:nvSpPr>
+          <p:cNvPr id="57" name="Прямоугольник 56"/>
           <p:cNvSpPr/>
           <p:nvPr/>
         </p:nvSpPr>
         <p:spPr>
           <a:xfrm>
-            <a:off x="6051065" y="3960674"/>
-            <a:ext cx="196916" cy="497685"/>
+            <a:off x="5604468" y="5281554"/>
+            <a:ext cx="196916" cy="932547"/>
           </a:xfrm>
           <a:prstGeom prst="rect">
             <a:avLst/>
@@ -6847,20 +6572,24 @@
       </p:sp>
       <p:cxnSp>
         <p:nvCxnSpPr>
-          <p:cNvPr id="51" name="Прямая со стрелкой 50"/>
+          <p:cNvPr id="60" name="Прямая со стрелкой 59"/>
           <p:cNvCxnSpPr/>
           <p:nvPr/>
         </p:nvCxnSpPr>
         <p:spPr>
-          <a:xfrm flipV="1">
-            <a:off x="4487178" y="3998352"/>
-            <a:ext cx="1556025" cy="5273"/>
+          <a:xfrm flipH="1">
+            <a:off x="4202383" y="3470051"/>
+            <a:ext cx="1393083" cy="0"/>
           </a:xfrm>
           <a:prstGeom prst="straightConnector1">
             <a:avLst/>
           </a:prstGeom>
-          <a:ln>
-            <a:tailEnd type="triangle"/>
+          <a:ln w="9525">
+            <a:solidFill>
+              <a:schemeClr val="tx1"/>
+            </a:solidFill>
+            <a:prstDash val="dash"/>
+            <a:tailEnd type="arrow"/>
           </a:ln>
         </p:spPr>
         <p:style>
@@ -6878,56 +6607,16 @@
           </a:fontRef>
         </p:style>
       </p:cxnSp>
-      <p:sp>
-        <p:nvSpPr>
-          <p:cNvPr id="52" name="TextBox 51"/>
-          <p:cNvSpPr txBox="1"/>
-          <p:nvPr/>
-        </p:nvSpPr>
-        <p:spPr>
-          <a:xfrm>
-            <a:off x="4736732" y="3937398"/>
-            <a:ext cx="1025040" cy="314584"/>
-          </a:xfrm>
-          <a:prstGeom prst="rect">
-            <a:avLst/>
-          </a:prstGeom>
-          <a:noFill/>
-        </p:spPr>
-        <p:txBody>
-          <a:bodyPr wrap="square" rtlCol="0">
-            <a:spAutoFit/>
-          </a:bodyPr>
-          <a:lstStyle/>
-          <a:p>
-            <a:r>
-              <a:rPr lang="en-US" sz="1200" dirty="0" smtClean="0">
-                <a:latin typeface="Bahnschrift Light Condensed" panose="020B0502040204020203" pitchFamily="34" charset="0"/>
-              </a:rPr>
-              <a:t>Id</a:t>
-            </a:r>
-            <a:r>
-              <a:rPr lang="ru-RU" sz="1200" dirty="0" smtClean="0">
-                <a:latin typeface="Bahnschrift Light Condensed" panose="020B0502040204020203" pitchFamily="34" charset="0"/>
-              </a:rPr>
-              <a:t> решения</a:t>
-            </a:r>
-            <a:endParaRPr lang="ru-RU" sz="1200" dirty="0">
-              <a:latin typeface="Bahnschrift Light Condensed" panose="020B0502040204020203" pitchFamily="34" charset="0"/>
-            </a:endParaRPr>
-          </a:p>
-        </p:txBody>
-      </p:sp>
       <p:cxnSp>
         <p:nvCxnSpPr>
-          <p:cNvPr id="53" name="Прямая со стрелкой 52"/>
+          <p:cNvPr id="63" name="Прямая со стрелкой 62"/>
           <p:cNvCxnSpPr/>
           <p:nvPr/>
         </p:nvCxnSpPr>
         <p:spPr>
           <a:xfrm flipH="1">
-            <a:off x="4511075" y="4400853"/>
-            <a:ext cx="1508229" cy="0"/>
+            <a:off x="2675076" y="7013944"/>
+            <a:ext cx="1337694" cy="11153"/>
           </a:xfrm>
           <a:prstGeom prst="straightConnector1">
             <a:avLst/>
@@ -6954,14 +6643,14 @@
       </p:cxnSp>
       <p:sp>
         <p:nvSpPr>
-          <p:cNvPr id="54" name="TextBox 53"/>
+          <p:cNvPr id="64" name="TextBox 63"/>
           <p:cNvSpPr txBox="1"/>
           <p:nvPr/>
         </p:nvSpPr>
         <p:spPr>
           <a:xfrm>
-            <a:off x="4903215" y="4425649"/>
-            <a:ext cx="785943" cy="314584"/>
+            <a:off x="2813955" y="7013944"/>
+            <a:ext cx="996836" cy="461665"/>
           </a:xfrm>
           <a:prstGeom prst="rect">
             <a:avLst/>
@@ -6978,7 +6667,7 @@
               <a:rPr lang="ru-RU" sz="1200" dirty="0" smtClean="0">
                 <a:latin typeface="Bahnschrift Light Condensed" panose="020B0502040204020203" pitchFamily="34" charset="0"/>
               </a:rPr>
-              <a:t>Загрузка</a:t>
+              <a:t>Результат решения</a:t>
             </a:r>
             <a:endParaRPr lang="ru-RU" sz="1200" dirty="0">
               <a:latin typeface="Bahnschrift Light Condensed" panose="020B0502040204020203" pitchFamily="34" charset="0"/>
@@ -6988,14 +6677,14 @@
       </p:sp>
       <p:sp>
         <p:nvSpPr>
-          <p:cNvPr id="57" name="Прямоугольник 56"/>
+          <p:cNvPr id="73" name="Прямоугольник 72"/>
           <p:cNvSpPr/>
           <p:nvPr/>
         </p:nvSpPr>
         <p:spPr>
           <a:xfrm>
-            <a:off x="6044519" y="5152102"/>
-            <a:ext cx="196916" cy="497685"/>
+            <a:off x="4046638" y="3960675"/>
+            <a:ext cx="144393" cy="748485"/>
           </a:xfrm>
           <a:prstGeom prst="rect">
             <a:avLst/>
@@ -7034,22 +6723,141 @@
           </a:p>
         </p:txBody>
       </p:sp>
+      <p:sp>
+        <p:nvSpPr>
+          <p:cNvPr id="9" name="Номер слайда 8"/>
+          <p:cNvSpPr>
+            <a:spLocks noGrp="1"/>
+          </p:cNvSpPr>
+          <p:nvPr>
+            <p:ph type="sldNum" sz="quarter" idx="12"/>
+          </p:nvPr>
+        </p:nvSpPr>
+        <p:spPr/>
+        <p:txBody>
+          <a:bodyPr/>
+          <a:lstStyle/>
+          <a:p>
+            <a:fld id="{62AE288B-ED16-4155-B555-A20169454F34}" type="slidenum">
+              <a:rPr lang="ru-RU" smtClean="0"/>
+              <a:t>13</a:t>
+            </a:fld>
+            <a:endParaRPr lang="ru-RU"/>
+          </a:p>
+        </p:txBody>
+      </p:sp>
+      <p:sp>
+        <p:nvSpPr>
+          <p:cNvPr id="65" name="TextBox 64"/>
+          <p:cNvSpPr txBox="1"/>
+          <p:nvPr/>
+        </p:nvSpPr>
+        <p:spPr>
+          <a:xfrm>
+            <a:off x="4460665" y="3133543"/>
+            <a:ext cx="1025040" cy="276999"/>
+          </a:xfrm>
+          <a:prstGeom prst="rect">
+            <a:avLst/>
+          </a:prstGeom>
+          <a:noFill/>
+        </p:spPr>
+        <p:txBody>
+          <a:bodyPr wrap="square" rtlCol="0">
+            <a:spAutoFit/>
+          </a:bodyPr>
+          <a:lstStyle/>
+          <a:p>
+            <a:r>
+              <a:rPr lang="en-US" sz="1200" dirty="0" smtClean="0">
+                <a:latin typeface="Bahnschrift Light Condensed" panose="020B0502040204020203" pitchFamily="34" charset="0"/>
+              </a:rPr>
+              <a:t>ID</a:t>
+            </a:r>
+            <a:r>
+              <a:rPr lang="ru-RU" sz="1200" dirty="0" smtClean="0">
+                <a:latin typeface="Bahnschrift Light Condensed" panose="020B0502040204020203" pitchFamily="34" charset="0"/>
+              </a:rPr>
+              <a:t> </a:t>
+            </a:r>
+            <a:r>
+              <a:rPr lang="ru-RU" sz="1200" dirty="0" smtClean="0">
+                <a:latin typeface="Bahnschrift Light Condensed" panose="020B0502040204020203" pitchFamily="34" charset="0"/>
+              </a:rPr>
+              <a:t>решения</a:t>
+            </a:r>
+            <a:endParaRPr lang="ru-RU" sz="1200" dirty="0">
+              <a:latin typeface="Bahnschrift Light Condensed" panose="020B0502040204020203" pitchFamily="34" charset="0"/>
+            </a:endParaRPr>
+          </a:p>
+        </p:txBody>
+      </p:sp>
+      <p:sp>
+        <p:nvSpPr>
+          <p:cNvPr id="71" name="TextBox 70"/>
+          <p:cNvSpPr txBox="1"/>
+          <p:nvPr/>
+        </p:nvSpPr>
+        <p:spPr>
+          <a:xfrm>
+            <a:off x="6223595" y="1731547"/>
+            <a:ext cx="698727" cy="276999"/>
+          </a:xfrm>
+          <a:prstGeom prst="rect">
+            <a:avLst/>
+          </a:prstGeom>
+          <a:noFill/>
+        </p:spPr>
+        <p:txBody>
+          <a:bodyPr wrap="square" rtlCol="0">
+            <a:spAutoFit/>
+          </a:bodyPr>
+          <a:lstStyle/>
+          <a:p>
+            <a:r>
+              <a:rPr lang="en-US" sz="1200" dirty="0" smtClean="0">
+                <a:latin typeface="Bahnschrift Light Condensed" panose="020B0502040204020203" pitchFamily="34" charset="0"/>
+              </a:rPr>
+              <a:t>ID</a:t>
+            </a:r>
+            <a:r>
+              <a:rPr lang="ru-RU" sz="1200" dirty="0" smtClean="0">
+                <a:latin typeface="Bahnschrift Light Condensed" panose="020B0502040204020203" pitchFamily="34" charset="0"/>
+              </a:rPr>
+              <a:t> </a:t>
+            </a:r>
+            <a:r>
+              <a:rPr lang="ru-RU" sz="1200" dirty="0" smtClean="0">
+                <a:latin typeface="Bahnschrift Light Condensed" panose="020B0502040204020203" pitchFamily="34" charset="0"/>
+              </a:rPr>
+              <a:t>задачи</a:t>
+            </a:r>
+            <a:endParaRPr lang="ru-RU" sz="1200" dirty="0">
+              <a:latin typeface="Bahnschrift Light Condensed" panose="020B0502040204020203" pitchFamily="34" charset="0"/>
+            </a:endParaRPr>
+          </a:p>
+        </p:txBody>
+      </p:sp>
       <p:cxnSp>
         <p:nvCxnSpPr>
-          <p:cNvPr id="58" name="Прямая со стрелкой 57"/>
+          <p:cNvPr id="74" name="Прямая со стрелкой 73"/>
           <p:cNvCxnSpPr/>
           <p:nvPr/>
         </p:nvCxnSpPr>
         <p:spPr>
-          <a:xfrm flipV="1">
-            <a:off x="4466240" y="5213057"/>
-            <a:ext cx="1556025" cy="5273"/>
+          <a:xfrm flipH="1">
+            <a:off x="5814599" y="2263043"/>
+            <a:ext cx="1393083" cy="0"/>
           </a:xfrm>
           <a:prstGeom prst="straightConnector1">
             <a:avLst/>
           </a:prstGeom>
-          <a:ln>
-            <a:tailEnd type="triangle"/>
+          <a:ln w="9525">
+            <a:solidFill>
+              <a:schemeClr val="tx1"/>
+            </a:solidFill>
+            <a:prstDash val="dash"/>
+            <a:tailEnd type="arrow"/>
           </a:ln>
         </p:spPr>
         <p:style>
@@ -7069,190 +6877,14 @@
       </p:cxnSp>
       <p:sp>
         <p:nvSpPr>
-          <p:cNvPr id="59" name="TextBox 58"/>
-          <p:cNvSpPr txBox="1"/>
-          <p:nvPr/>
-        </p:nvSpPr>
-        <p:spPr>
-          <a:xfrm>
-            <a:off x="4715794" y="5152102"/>
-            <a:ext cx="1025040" cy="314584"/>
-          </a:xfrm>
-          <a:prstGeom prst="rect">
-            <a:avLst/>
-          </a:prstGeom>
-          <a:noFill/>
-        </p:spPr>
-        <p:txBody>
-          <a:bodyPr wrap="square" rtlCol="0">
-            <a:spAutoFit/>
-          </a:bodyPr>
-          <a:lstStyle/>
-          <a:p>
-            <a:r>
-              <a:rPr lang="en-US" sz="1200" dirty="0" smtClean="0">
-                <a:latin typeface="Bahnschrift Light Condensed" panose="020B0502040204020203" pitchFamily="34" charset="0"/>
-              </a:rPr>
-              <a:t>Id</a:t>
-            </a:r>
-            <a:r>
-              <a:rPr lang="ru-RU" sz="1200" dirty="0" smtClean="0">
-                <a:latin typeface="Bahnschrift Light Condensed" panose="020B0502040204020203" pitchFamily="34" charset="0"/>
-              </a:rPr>
-              <a:t> решения</a:t>
-            </a:r>
-            <a:endParaRPr lang="ru-RU" sz="1200" dirty="0">
-              <a:latin typeface="Bahnschrift Light Condensed" panose="020B0502040204020203" pitchFamily="34" charset="0"/>
-            </a:endParaRPr>
-          </a:p>
-        </p:txBody>
-      </p:sp>
-      <p:cxnSp>
-        <p:nvCxnSpPr>
-          <p:cNvPr id="60" name="Прямая со стрелкой 59"/>
-          <p:cNvCxnSpPr/>
-          <p:nvPr/>
-        </p:nvCxnSpPr>
-        <p:spPr>
-          <a:xfrm flipH="1">
-            <a:off x="4490137" y="5615557"/>
-            <a:ext cx="1508229" cy="0"/>
-          </a:xfrm>
-          <a:prstGeom prst="straightConnector1">
-            <a:avLst/>
-          </a:prstGeom>
-          <a:ln w="9525">
-            <a:prstDash val="dash"/>
-            <a:tailEnd type="triangle"/>
-          </a:ln>
-        </p:spPr>
-        <p:style>
-          <a:lnRef idx="1">
-            <a:schemeClr val="dk1"/>
-          </a:lnRef>
-          <a:fillRef idx="0">
-            <a:schemeClr val="dk1"/>
-          </a:fillRef>
-          <a:effectRef idx="0">
-            <a:schemeClr val="dk1"/>
-          </a:effectRef>
-          <a:fontRef idx="minor">
-            <a:schemeClr val="tx1"/>
-          </a:fontRef>
-        </p:style>
-      </p:cxnSp>
-      <p:sp>
-        <p:nvSpPr>
-          <p:cNvPr id="61" name="TextBox 60"/>
-          <p:cNvSpPr txBox="1"/>
-          <p:nvPr/>
-        </p:nvSpPr>
-        <p:spPr>
-          <a:xfrm>
-            <a:off x="4615142" y="5615557"/>
-            <a:ext cx="1511189" cy="314584"/>
-          </a:xfrm>
-          <a:prstGeom prst="rect">
-            <a:avLst/>
-          </a:prstGeom>
-          <a:noFill/>
-        </p:spPr>
-        <p:txBody>
-          <a:bodyPr wrap="square" rtlCol="0">
-            <a:spAutoFit/>
-          </a:bodyPr>
-          <a:lstStyle/>
-          <a:p>
-            <a:r>
-              <a:rPr lang="ru-RU" sz="1200" dirty="0" smtClean="0">
-                <a:latin typeface="Bahnschrift Light Condensed" panose="020B0502040204020203" pitchFamily="34" charset="0"/>
-              </a:rPr>
-              <a:t>Результат решения</a:t>
-            </a:r>
-            <a:endParaRPr lang="ru-RU" sz="1200" dirty="0">
-              <a:latin typeface="Bahnschrift Light Condensed" panose="020B0502040204020203" pitchFamily="34" charset="0"/>
-            </a:endParaRPr>
-          </a:p>
-        </p:txBody>
-      </p:sp>
-      <p:cxnSp>
-        <p:nvCxnSpPr>
-          <p:cNvPr id="63" name="Прямая со стрелкой 62"/>
-          <p:cNvCxnSpPr/>
-          <p:nvPr/>
-        </p:nvCxnSpPr>
-        <p:spPr>
-          <a:xfrm flipH="1">
-            <a:off x="2675080" y="5592696"/>
-            <a:ext cx="1581990" cy="0"/>
-          </a:xfrm>
-          <a:prstGeom prst="straightConnector1">
-            <a:avLst/>
-          </a:prstGeom>
-          <a:ln w="9525">
-            <a:prstDash val="dash"/>
-            <a:tailEnd type="triangle"/>
-          </a:ln>
-        </p:spPr>
-        <p:style>
-          <a:lnRef idx="1">
-            <a:schemeClr val="dk1"/>
-          </a:lnRef>
-          <a:fillRef idx="0">
-            <a:schemeClr val="dk1"/>
-          </a:fillRef>
-          <a:effectRef idx="0">
-            <a:schemeClr val="dk1"/>
-          </a:effectRef>
-          <a:fontRef idx="minor">
-            <a:schemeClr val="tx1"/>
-          </a:fontRef>
-        </p:style>
-      </p:cxnSp>
-      <p:sp>
-        <p:nvSpPr>
-          <p:cNvPr id="64" name="TextBox 63"/>
-          <p:cNvSpPr txBox="1"/>
-          <p:nvPr/>
-        </p:nvSpPr>
-        <p:spPr>
-          <a:xfrm>
-            <a:off x="2813958" y="5581544"/>
-            <a:ext cx="1511189" cy="314584"/>
-          </a:xfrm>
-          <a:prstGeom prst="rect">
-            <a:avLst/>
-          </a:prstGeom>
-          <a:noFill/>
-        </p:spPr>
-        <p:txBody>
-          <a:bodyPr wrap="square" rtlCol="0">
-            <a:spAutoFit/>
-          </a:bodyPr>
-          <a:lstStyle/>
-          <a:p>
-            <a:r>
-              <a:rPr lang="ru-RU" sz="1200" dirty="0" smtClean="0">
-                <a:latin typeface="Bahnschrift Light Condensed" panose="020B0502040204020203" pitchFamily="34" charset="0"/>
-              </a:rPr>
-              <a:t>Результат решения</a:t>
-            </a:r>
-            <a:endParaRPr lang="ru-RU" sz="1200" dirty="0">
-              <a:latin typeface="Bahnschrift Light Condensed" panose="020B0502040204020203" pitchFamily="34" charset="0"/>
-            </a:endParaRPr>
-          </a:p>
-        </p:txBody>
-      </p:sp>
-      <p:sp>
-        <p:nvSpPr>
-          <p:cNvPr id="73" name="Прямоугольник 72"/>
+          <p:cNvPr id="76" name="Прямоугольник 75"/>
           <p:cNvSpPr/>
           <p:nvPr/>
         </p:nvSpPr>
         <p:spPr>
           <a:xfrm>
-            <a:off x="4314942" y="3960674"/>
-            <a:ext cx="127031" cy="1689112"/>
+            <a:off x="7246716" y="2559647"/>
+            <a:ext cx="196916" cy="668293"/>
           </a:xfrm>
           <a:prstGeom prst="rect">
             <a:avLst/>
@@ -7291,16 +6923,49 @@
           </a:p>
         </p:txBody>
       </p:sp>
-      <p:sp>
-        <p:nvSpPr>
-          <p:cNvPr id="75" name="TextBox 74"/>
+      <p:cxnSp>
+        <p:nvCxnSpPr>
+          <p:cNvPr id="77" name="Прямая со стрелкой 76"/>
+          <p:cNvCxnSpPr/>
+          <p:nvPr/>
+        </p:nvCxnSpPr>
+        <p:spPr>
+          <a:xfrm flipV="1">
+            <a:off x="5820811" y="2652472"/>
+            <a:ext cx="1417237" cy="8853"/>
+          </a:xfrm>
+          <a:prstGeom prst="straightConnector1">
+            <a:avLst/>
+          </a:prstGeom>
+          <a:ln>
+            <a:tailEnd type="triangle"/>
+          </a:ln>
+        </p:spPr>
+        <p:style>
+          <a:lnRef idx="1">
+            <a:schemeClr val="dk1"/>
+          </a:lnRef>
+          <a:fillRef idx="0">
+            <a:schemeClr val="dk1"/>
+          </a:fillRef>
+          <a:effectRef idx="0">
+            <a:schemeClr val="dk1"/>
+          </a:effectRef>
+          <a:fontRef idx="minor">
+            <a:schemeClr val="tx1"/>
+          </a:fontRef>
+        </p:style>
+      </p:cxnSp>
+      <p:sp>
+        <p:nvSpPr>
+          <p:cNvPr id="78" name="TextBox 77"/>
           <p:cNvSpPr txBox="1"/>
           <p:nvPr/>
         </p:nvSpPr>
         <p:spPr>
           <a:xfrm>
-            <a:off x="4589248" y="6223200"/>
-            <a:ext cx="3861798" cy="369332"/>
+            <a:off x="6083983" y="3156547"/>
+            <a:ext cx="1236229" cy="276999"/>
           </a:xfrm>
           <a:prstGeom prst="rect">
             <a:avLst/>
@@ -7314,18 +6979,18 @@
           <a:lstStyle/>
           <a:p>
             <a:r>
-              <a:rPr lang="ru-RU" dirty="0">
+              <a:rPr lang="en-US" sz="1200" dirty="0" smtClean="0">
                 <a:latin typeface="Bahnschrift Light Condensed" panose="020B0502040204020203" pitchFamily="34" charset="0"/>
               </a:rPr>
-              <a:t>Рисунок </a:t>
-            </a:r>
-            <a:r>
-              <a:rPr lang="ru-RU" dirty="0" smtClean="0">
+              <a:t>ID</a:t>
+            </a:r>
+            <a:r>
+              <a:rPr lang="ru-RU" sz="1200" dirty="0" smtClean="0">
                 <a:latin typeface="Bahnschrift Light Condensed" panose="020B0502040204020203" pitchFamily="34" charset="0"/>
               </a:rPr>
-              <a:t>9 – Процесс проверки решения</a:t>
-            </a:r>
-            <a:endParaRPr lang="ru-RU" dirty="0">
+              <a:t> решения</a:t>
+            </a:r>
+            <a:endParaRPr lang="ru-RU" sz="1200" dirty="0">
               <a:latin typeface="Bahnschrift Light Condensed" panose="020B0502040204020203" pitchFamily="34" charset="0"/>
             </a:endParaRPr>
           </a:p>
@@ -7333,24 +6998,1133 @@
       </p:sp>
       <p:sp>
         <p:nvSpPr>
-          <p:cNvPr id="9" name="Номер слайда 8"/>
-          <p:cNvSpPr>
-            <a:spLocks noGrp="1"/>
-          </p:cNvSpPr>
-          <p:nvPr>
-            <p:ph type="sldNum" sz="quarter" idx="12"/>
-          </p:nvPr>
-        </p:nvSpPr>
-        <p:spPr/>
-        <p:txBody>
-          <a:bodyPr/>
+          <p:cNvPr id="79" name="TextBox 78"/>
+          <p:cNvSpPr txBox="1"/>
+          <p:nvPr/>
+        </p:nvSpPr>
+        <p:spPr>
+          <a:xfrm>
+            <a:off x="6241883" y="2639851"/>
+            <a:ext cx="698727" cy="276999"/>
+          </a:xfrm>
+          <a:prstGeom prst="rect">
+            <a:avLst/>
+          </a:prstGeom>
+          <a:noFill/>
+        </p:spPr>
+        <p:txBody>
+          <a:bodyPr wrap="square" rtlCol="0">
+            <a:spAutoFit/>
+          </a:bodyPr>
           <a:lstStyle/>
           <a:p>
-            <a:fld id="{62AE288B-ED16-4155-B555-A20169454F34}" type="slidenum">
-              <a:rPr lang="ru-RU" smtClean="0"/>
-              <a:t>13</a:t>
-            </a:fld>
+            <a:r>
+              <a:rPr lang="ru-RU" sz="1200" dirty="0" smtClean="0">
+                <a:latin typeface="Bahnschrift Light Condensed" panose="020B0502040204020203" pitchFamily="34" charset="0"/>
+              </a:rPr>
+              <a:t>Решение</a:t>
+            </a:r>
+            <a:endParaRPr lang="ru-RU" sz="1200" dirty="0">
+              <a:latin typeface="Bahnschrift Light Condensed" panose="020B0502040204020203" pitchFamily="34" charset="0"/>
+            </a:endParaRPr>
+          </a:p>
+        </p:txBody>
+      </p:sp>
+      <p:cxnSp>
+        <p:nvCxnSpPr>
+          <p:cNvPr id="80" name="Прямая со стрелкой 79"/>
+          <p:cNvCxnSpPr/>
+          <p:nvPr/>
+        </p:nvCxnSpPr>
+        <p:spPr>
+          <a:xfrm flipH="1">
+            <a:off x="5832887" y="3171347"/>
+            <a:ext cx="1393083" cy="0"/>
+          </a:xfrm>
+          <a:prstGeom prst="straightConnector1">
+            <a:avLst/>
+          </a:prstGeom>
+          <a:ln w="9525">
+            <a:solidFill>
+              <a:schemeClr val="tx1"/>
+            </a:solidFill>
+            <a:prstDash val="dash"/>
+            <a:tailEnd type="arrow"/>
+          </a:ln>
+        </p:spPr>
+        <p:style>
+          <a:lnRef idx="1">
+            <a:schemeClr val="dk1"/>
+          </a:lnRef>
+          <a:fillRef idx="0">
+            <a:schemeClr val="dk1"/>
+          </a:fillRef>
+          <a:effectRef idx="0">
+            <a:schemeClr val="dk1"/>
+          </a:effectRef>
+          <a:fontRef idx="minor">
+            <a:schemeClr val="tx1"/>
+          </a:fontRef>
+        </p:style>
+      </p:cxnSp>
+      <p:cxnSp>
+        <p:nvCxnSpPr>
+          <p:cNvPr id="81" name="Прямая со стрелкой 80"/>
+          <p:cNvCxnSpPr/>
+          <p:nvPr/>
+        </p:nvCxnSpPr>
+        <p:spPr>
+          <a:xfrm flipV="1">
+            <a:off x="5809069" y="3525894"/>
+            <a:ext cx="2662965" cy="4798"/>
+          </a:xfrm>
+          <a:prstGeom prst="straightConnector1">
+            <a:avLst/>
+          </a:prstGeom>
+          <a:ln w="9525">
+            <a:solidFill>
+              <a:schemeClr val="tx1"/>
+            </a:solidFill>
+            <a:prstDash val="solid"/>
+            <a:tailEnd type="arrow"/>
+          </a:ln>
+        </p:spPr>
+        <p:style>
+          <a:lnRef idx="1">
+            <a:schemeClr val="dk1"/>
+          </a:lnRef>
+          <a:fillRef idx="0">
+            <a:schemeClr val="dk1"/>
+          </a:fillRef>
+          <a:effectRef idx="0">
+            <a:schemeClr val="dk1"/>
+          </a:effectRef>
+          <a:fontRef idx="minor">
+            <a:schemeClr val="tx1"/>
+          </a:fontRef>
+        </p:style>
+      </p:cxnSp>
+      <p:sp>
+        <p:nvSpPr>
+          <p:cNvPr id="85" name="TextBox 84"/>
+          <p:cNvSpPr txBox="1"/>
+          <p:nvPr/>
+        </p:nvSpPr>
+        <p:spPr>
+          <a:xfrm>
+            <a:off x="6503818" y="3525894"/>
+            <a:ext cx="874503" cy="461665"/>
+          </a:xfrm>
+          <a:prstGeom prst="rect">
+            <a:avLst/>
+          </a:prstGeom>
+          <a:noFill/>
+        </p:spPr>
+        <p:txBody>
+          <a:bodyPr wrap="square" rtlCol="0">
+            <a:spAutoFit/>
+          </a:bodyPr>
+          <a:lstStyle/>
+          <a:p>
+            <a:r>
+              <a:rPr lang="ru-RU" sz="1200" dirty="0" smtClean="0">
+                <a:latin typeface="Bahnschrift Light Condensed" panose="020B0502040204020203" pitchFamily="34" charset="0"/>
+              </a:rPr>
+              <a:t>Код, тесты</a:t>
+            </a:r>
+            <a:r>
+              <a:rPr lang="en-US" sz="1200" dirty="0" smtClean="0">
+                <a:latin typeface="Bahnschrift Light Condensed" panose="020B0502040204020203" pitchFamily="34" charset="0"/>
+              </a:rPr>
+              <a:t>, ID</a:t>
+            </a:r>
+            <a:r>
+              <a:rPr lang="ru-RU" sz="1200" dirty="0" smtClean="0">
+                <a:latin typeface="Bahnschrift Light Condensed" panose="020B0502040204020203" pitchFamily="34" charset="0"/>
+              </a:rPr>
+              <a:t> решения</a:t>
+            </a:r>
+            <a:endParaRPr lang="ru-RU" sz="1200" dirty="0">
+              <a:latin typeface="Bahnschrift Light Condensed" panose="020B0502040204020203" pitchFamily="34" charset="0"/>
+            </a:endParaRPr>
+          </a:p>
+        </p:txBody>
+      </p:sp>
+      <p:cxnSp>
+        <p:nvCxnSpPr>
+          <p:cNvPr id="86" name="Прямая со стрелкой 85"/>
+          <p:cNvCxnSpPr/>
+          <p:nvPr/>
+        </p:nvCxnSpPr>
+        <p:spPr>
+          <a:xfrm flipV="1">
+            <a:off x="4197243" y="4055568"/>
+            <a:ext cx="1417237" cy="8853"/>
+          </a:xfrm>
+          <a:prstGeom prst="straightConnector1">
+            <a:avLst/>
+          </a:prstGeom>
+          <a:ln>
+            <a:tailEnd type="triangle"/>
+          </a:ln>
+        </p:spPr>
+        <p:style>
+          <a:lnRef idx="1">
+            <a:schemeClr val="dk1"/>
+          </a:lnRef>
+          <a:fillRef idx="0">
+            <a:schemeClr val="dk1"/>
+          </a:fillRef>
+          <a:effectRef idx="0">
+            <a:schemeClr val="dk1"/>
+          </a:effectRef>
+          <a:fontRef idx="minor">
+            <a:schemeClr val="tx1"/>
+          </a:fontRef>
+        </p:style>
+      </p:cxnSp>
+      <p:sp>
+        <p:nvSpPr>
+          <p:cNvPr id="87" name="TextBox 86"/>
+          <p:cNvSpPr txBox="1"/>
+          <p:nvPr/>
+        </p:nvSpPr>
+        <p:spPr>
+          <a:xfrm>
+            <a:off x="4466347" y="6960520"/>
+            <a:ext cx="1318340" cy="461665"/>
+          </a:xfrm>
+          <a:prstGeom prst="rect">
+            <a:avLst/>
+          </a:prstGeom>
+          <a:noFill/>
+        </p:spPr>
+        <p:txBody>
+          <a:bodyPr wrap="square" rtlCol="0">
+            <a:spAutoFit/>
+          </a:bodyPr>
+          <a:lstStyle/>
+          <a:p>
+            <a:r>
+              <a:rPr lang="ru-RU" sz="1200" dirty="0" smtClean="0">
+                <a:latin typeface="Bahnschrift Light Condensed" panose="020B0502040204020203" pitchFamily="34" charset="0"/>
+              </a:rPr>
+              <a:t>Решение с результатом</a:t>
+            </a:r>
+            <a:endParaRPr lang="ru-RU" sz="1200" dirty="0">
+              <a:latin typeface="Bahnschrift Light Condensed" panose="020B0502040204020203" pitchFamily="34" charset="0"/>
+            </a:endParaRPr>
+          </a:p>
+        </p:txBody>
+      </p:sp>
+      <p:sp>
+        <p:nvSpPr>
+          <p:cNvPr id="88" name="TextBox 87"/>
+          <p:cNvSpPr txBox="1"/>
+          <p:nvPr/>
+        </p:nvSpPr>
+        <p:spPr>
+          <a:xfrm>
+            <a:off x="4473029" y="4042947"/>
+            <a:ext cx="844013" cy="276999"/>
+          </a:xfrm>
+          <a:prstGeom prst="rect">
+            <a:avLst/>
+          </a:prstGeom>
+          <a:noFill/>
+        </p:spPr>
+        <p:txBody>
+          <a:bodyPr wrap="square" rtlCol="0">
+            <a:spAutoFit/>
+          </a:bodyPr>
+          <a:lstStyle/>
+          <a:p>
+            <a:r>
+              <a:rPr lang="en-US" sz="1200" dirty="0" smtClean="0">
+                <a:latin typeface="Bahnschrift Light Condensed" panose="020B0502040204020203" pitchFamily="34" charset="0"/>
+              </a:rPr>
+              <a:t>ID</a:t>
+            </a:r>
+            <a:r>
+              <a:rPr lang="ru-RU" sz="1200" dirty="0" smtClean="0">
+                <a:latin typeface="Bahnschrift Light Condensed" panose="020B0502040204020203" pitchFamily="34" charset="0"/>
+              </a:rPr>
+              <a:t> решения</a:t>
+            </a:r>
+            <a:endParaRPr lang="ru-RU" sz="1200" dirty="0">
+              <a:latin typeface="Bahnschrift Light Condensed" panose="020B0502040204020203" pitchFamily="34" charset="0"/>
+            </a:endParaRPr>
+          </a:p>
+        </p:txBody>
+      </p:sp>
+      <p:cxnSp>
+        <p:nvCxnSpPr>
+          <p:cNvPr id="89" name="Прямая со стрелкой 88"/>
+          <p:cNvCxnSpPr/>
+          <p:nvPr/>
+        </p:nvCxnSpPr>
+        <p:spPr>
+          <a:xfrm flipH="1">
+            <a:off x="4209319" y="4574443"/>
+            <a:ext cx="1393083" cy="0"/>
+          </a:xfrm>
+          <a:prstGeom prst="straightConnector1">
+            <a:avLst/>
+          </a:prstGeom>
+          <a:ln w="9525">
+            <a:solidFill>
+              <a:schemeClr val="tx1"/>
+            </a:solidFill>
+            <a:prstDash val="dash"/>
+            <a:tailEnd type="arrow"/>
+          </a:ln>
+        </p:spPr>
+        <p:style>
+          <a:lnRef idx="1">
+            <a:schemeClr val="dk1"/>
+          </a:lnRef>
+          <a:fillRef idx="0">
+            <a:schemeClr val="dk1"/>
+          </a:fillRef>
+          <a:effectRef idx="0">
+            <a:schemeClr val="dk1"/>
+          </a:effectRef>
+          <a:fontRef idx="minor">
+            <a:schemeClr val="tx1"/>
+          </a:fontRef>
+        </p:style>
+      </p:cxnSp>
+      <p:cxnSp>
+        <p:nvCxnSpPr>
+          <p:cNvPr id="90" name="Прямая со стрелкой 89"/>
+          <p:cNvCxnSpPr/>
+          <p:nvPr/>
+        </p:nvCxnSpPr>
+        <p:spPr>
+          <a:xfrm flipH="1">
+            <a:off x="5801384" y="5391386"/>
+            <a:ext cx="2670651" cy="0"/>
+          </a:xfrm>
+          <a:prstGeom prst="straightConnector1">
+            <a:avLst/>
+          </a:prstGeom>
+          <a:ln w="9525">
+            <a:solidFill>
+              <a:schemeClr val="tx1"/>
+            </a:solidFill>
+            <a:prstDash val="solid"/>
+            <a:tailEnd type="arrow"/>
+          </a:ln>
+        </p:spPr>
+        <p:style>
+          <a:lnRef idx="1">
+            <a:schemeClr val="dk1"/>
+          </a:lnRef>
+          <a:fillRef idx="0">
+            <a:schemeClr val="dk1"/>
+          </a:fillRef>
+          <a:effectRef idx="0">
+            <a:schemeClr val="dk1"/>
+          </a:effectRef>
+          <a:fontRef idx="minor">
+            <a:schemeClr val="tx1"/>
+          </a:fontRef>
+        </p:style>
+      </p:cxnSp>
+      <p:sp>
+        <p:nvSpPr>
+          <p:cNvPr id="94" name="TextBox 93"/>
+          <p:cNvSpPr txBox="1"/>
+          <p:nvPr/>
+        </p:nvSpPr>
+        <p:spPr>
+          <a:xfrm>
+            <a:off x="6174750" y="5123908"/>
+            <a:ext cx="1882858" cy="276999"/>
+          </a:xfrm>
+          <a:prstGeom prst="rect">
+            <a:avLst/>
+          </a:prstGeom>
+          <a:noFill/>
+        </p:spPr>
+        <p:txBody>
+          <a:bodyPr wrap="square" rtlCol="0">
+            <a:spAutoFit/>
+          </a:bodyPr>
+          <a:lstStyle/>
+          <a:p>
+            <a:r>
+              <a:rPr lang="ru-RU" sz="1200" dirty="0" smtClean="0">
+                <a:latin typeface="Bahnschrift Light Condensed" panose="020B0502040204020203" pitchFamily="34" charset="0"/>
+              </a:rPr>
+              <a:t>Результат  решения</a:t>
+            </a:r>
+            <a:r>
+              <a:rPr lang="en-US" sz="1200" dirty="0" smtClean="0">
+                <a:latin typeface="Bahnschrift Light Condensed" panose="020B0502040204020203" pitchFamily="34" charset="0"/>
+              </a:rPr>
+              <a:t>, ID</a:t>
+            </a:r>
+            <a:r>
+              <a:rPr lang="ru-RU" sz="1200" dirty="0" smtClean="0">
+                <a:latin typeface="Bahnschrift Light Condensed" panose="020B0502040204020203" pitchFamily="34" charset="0"/>
+              </a:rPr>
+              <a:t> решения</a:t>
+            </a:r>
+            <a:endParaRPr lang="ru-RU" sz="1200" dirty="0">
+              <a:latin typeface="Bahnschrift Light Condensed" panose="020B0502040204020203" pitchFamily="34" charset="0"/>
+            </a:endParaRPr>
+          </a:p>
+        </p:txBody>
+      </p:sp>
+      <p:sp>
+        <p:nvSpPr>
+          <p:cNvPr id="95" name="Прямоугольник 94"/>
+          <p:cNvSpPr/>
+          <p:nvPr/>
+        </p:nvSpPr>
+        <p:spPr>
+          <a:xfrm>
+            <a:off x="7221754" y="5530238"/>
+            <a:ext cx="196916" cy="668293"/>
+          </a:xfrm>
+          <a:prstGeom prst="rect">
+            <a:avLst/>
+          </a:prstGeom>
+          <a:solidFill>
+            <a:schemeClr val="bg1"/>
+          </a:solidFill>
+          <a:ln>
+            <a:solidFill>
+              <a:schemeClr val="tx1"/>
+            </a:solidFill>
+          </a:ln>
+        </p:spPr>
+        <p:style>
+          <a:lnRef idx="2">
+            <a:schemeClr val="accent1">
+              <a:shade val="50000"/>
+            </a:schemeClr>
+          </a:lnRef>
+          <a:fillRef idx="1">
+            <a:schemeClr val="accent1"/>
+          </a:fillRef>
+          <a:effectRef idx="0">
+            <a:schemeClr val="accent1"/>
+          </a:effectRef>
+          <a:fontRef idx="minor">
+            <a:schemeClr val="lt1"/>
+          </a:fontRef>
+        </p:style>
+        <p:txBody>
+          <a:bodyPr rtlCol="0" anchor="ctr"/>
+          <a:lstStyle/>
+          <a:p>
+            <a:pPr algn="ctr"/>
             <a:endParaRPr lang="ru-RU"/>
+          </a:p>
+        </p:txBody>
+      </p:sp>
+      <p:cxnSp>
+        <p:nvCxnSpPr>
+          <p:cNvPr id="96" name="Прямая со стрелкой 95"/>
+          <p:cNvCxnSpPr/>
+          <p:nvPr/>
+        </p:nvCxnSpPr>
+        <p:spPr>
+          <a:xfrm flipV="1">
+            <a:off x="5819354" y="5609665"/>
+            <a:ext cx="1417237" cy="8853"/>
+          </a:xfrm>
+          <a:prstGeom prst="straightConnector1">
+            <a:avLst/>
+          </a:prstGeom>
+          <a:ln>
+            <a:tailEnd type="triangle"/>
+          </a:ln>
+        </p:spPr>
+        <p:style>
+          <a:lnRef idx="1">
+            <a:schemeClr val="dk1"/>
+          </a:lnRef>
+          <a:fillRef idx="0">
+            <a:schemeClr val="dk1"/>
+          </a:fillRef>
+          <a:effectRef idx="0">
+            <a:schemeClr val="dk1"/>
+          </a:effectRef>
+          <a:fontRef idx="minor">
+            <a:schemeClr val="tx1"/>
+          </a:fontRef>
+        </p:style>
+      </p:cxnSp>
+      <p:sp>
+        <p:nvSpPr>
+          <p:cNvPr id="97" name="TextBox 96"/>
+          <p:cNvSpPr txBox="1"/>
+          <p:nvPr/>
+        </p:nvSpPr>
+        <p:spPr>
+          <a:xfrm>
+            <a:off x="6065696" y="5597044"/>
+            <a:ext cx="873458" cy="461665"/>
+          </a:xfrm>
+          <a:prstGeom prst="rect">
+            <a:avLst/>
+          </a:prstGeom>
+          <a:noFill/>
+        </p:spPr>
+        <p:txBody>
+          <a:bodyPr wrap="square" rtlCol="0">
+            <a:spAutoFit/>
+          </a:bodyPr>
+          <a:lstStyle/>
+          <a:p>
+            <a:r>
+              <a:rPr lang="en-US" sz="1200" dirty="0" smtClean="0">
+                <a:latin typeface="Bahnschrift Light Condensed" panose="020B0502040204020203" pitchFamily="34" charset="0"/>
+              </a:rPr>
+              <a:t>ID </a:t>
+            </a:r>
+            <a:r>
+              <a:rPr lang="ru-RU" sz="1200" dirty="0" smtClean="0">
+                <a:latin typeface="Bahnschrift Light Condensed" panose="020B0502040204020203" pitchFamily="34" charset="0"/>
+              </a:rPr>
+              <a:t>решения</a:t>
+            </a:r>
+            <a:r>
+              <a:rPr lang="en-US" sz="1200" dirty="0" smtClean="0">
+                <a:latin typeface="Bahnschrift Light Condensed" panose="020B0502040204020203" pitchFamily="34" charset="0"/>
+              </a:rPr>
+              <a:t>,</a:t>
+            </a:r>
+            <a:r>
+              <a:rPr lang="ru-RU" sz="1200" dirty="0" smtClean="0">
+                <a:latin typeface="Bahnschrift Light Condensed" panose="020B0502040204020203" pitchFamily="34" charset="0"/>
+              </a:rPr>
+              <a:t> результат</a:t>
+            </a:r>
+            <a:endParaRPr lang="ru-RU" sz="1200" dirty="0">
+              <a:latin typeface="Bahnschrift Light Condensed" panose="020B0502040204020203" pitchFamily="34" charset="0"/>
+            </a:endParaRPr>
+          </a:p>
+        </p:txBody>
+      </p:sp>
+      <p:sp>
+        <p:nvSpPr>
+          <p:cNvPr id="103" name="Прямоугольник 102"/>
+          <p:cNvSpPr/>
+          <p:nvPr/>
+        </p:nvSpPr>
+        <p:spPr>
+          <a:xfrm>
+            <a:off x="7232925" y="3938180"/>
+            <a:ext cx="196916" cy="668293"/>
+          </a:xfrm>
+          <a:prstGeom prst="rect">
+            <a:avLst/>
+          </a:prstGeom>
+          <a:solidFill>
+            <a:schemeClr val="bg1"/>
+          </a:solidFill>
+          <a:ln>
+            <a:solidFill>
+              <a:schemeClr val="tx1"/>
+            </a:solidFill>
+          </a:ln>
+        </p:spPr>
+        <p:style>
+          <a:lnRef idx="2">
+            <a:schemeClr val="accent1">
+              <a:shade val="50000"/>
+            </a:schemeClr>
+          </a:lnRef>
+          <a:fillRef idx="1">
+            <a:schemeClr val="accent1"/>
+          </a:fillRef>
+          <a:effectRef idx="0">
+            <a:schemeClr val="accent1"/>
+          </a:effectRef>
+          <a:fontRef idx="minor">
+            <a:schemeClr val="lt1"/>
+          </a:fontRef>
+        </p:style>
+        <p:txBody>
+          <a:bodyPr rtlCol="0" anchor="ctr"/>
+          <a:lstStyle/>
+          <a:p>
+            <a:pPr algn="ctr"/>
+            <a:endParaRPr lang="ru-RU"/>
+          </a:p>
+        </p:txBody>
+      </p:sp>
+      <p:cxnSp>
+        <p:nvCxnSpPr>
+          <p:cNvPr id="104" name="Прямая со стрелкой 103"/>
+          <p:cNvCxnSpPr/>
+          <p:nvPr/>
+        </p:nvCxnSpPr>
+        <p:spPr>
+          <a:xfrm flipV="1">
+            <a:off x="5830525" y="4017607"/>
+            <a:ext cx="1417237" cy="8853"/>
+          </a:xfrm>
+          <a:prstGeom prst="straightConnector1">
+            <a:avLst/>
+          </a:prstGeom>
+          <a:ln>
+            <a:tailEnd type="triangle"/>
+          </a:ln>
+        </p:spPr>
+        <p:style>
+          <a:lnRef idx="1">
+            <a:schemeClr val="dk1"/>
+          </a:lnRef>
+          <a:fillRef idx="0">
+            <a:schemeClr val="dk1"/>
+          </a:fillRef>
+          <a:effectRef idx="0">
+            <a:schemeClr val="dk1"/>
+          </a:effectRef>
+          <a:fontRef idx="minor">
+            <a:schemeClr val="tx1"/>
+          </a:fontRef>
+        </p:style>
+      </p:cxnSp>
+      <p:sp>
+        <p:nvSpPr>
+          <p:cNvPr id="105" name="TextBox 104"/>
+          <p:cNvSpPr txBox="1"/>
+          <p:nvPr/>
+        </p:nvSpPr>
+        <p:spPr>
+          <a:xfrm>
+            <a:off x="6076867" y="4004986"/>
+            <a:ext cx="873458" cy="276999"/>
+          </a:xfrm>
+          <a:prstGeom prst="rect">
+            <a:avLst/>
+          </a:prstGeom>
+          <a:noFill/>
+        </p:spPr>
+        <p:txBody>
+          <a:bodyPr wrap="square" rtlCol="0">
+            <a:spAutoFit/>
+          </a:bodyPr>
+          <a:lstStyle/>
+          <a:p>
+            <a:r>
+              <a:rPr lang="en-US" sz="1200" dirty="0" smtClean="0">
+                <a:latin typeface="Bahnschrift Light Condensed" panose="020B0502040204020203" pitchFamily="34" charset="0"/>
+              </a:rPr>
+              <a:t>ID </a:t>
+            </a:r>
+            <a:r>
+              <a:rPr lang="ru-RU" sz="1200" dirty="0" smtClean="0">
+                <a:latin typeface="Bahnschrift Light Condensed" panose="020B0502040204020203" pitchFamily="34" charset="0"/>
+              </a:rPr>
+              <a:t>решения</a:t>
+            </a:r>
+          </a:p>
+        </p:txBody>
+      </p:sp>
+      <p:sp>
+        <p:nvSpPr>
+          <p:cNvPr id="106" name="TextBox 105"/>
+          <p:cNvSpPr txBox="1"/>
+          <p:nvPr/>
+        </p:nvSpPr>
+        <p:spPr>
+          <a:xfrm>
+            <a:off x="5915547" y="4530994"/>
+            <a:ext cx="1232278" cy="461665"/>
+          </a:xfrm>
+          <a:prstGeom prst="rect">
+            <a:avLst/>
+          </a:prstGeom>
+          <a:noFill/>
+        </p:spPr>
+        <p:txBody>
+          <a:bodyPr wrap="square" rtlCol="0">
+            <a:spAutoFit/>
+          </a:bodyPr>
+          <a:lstStyle/>
+          <a:p>
+            <a:r>
+              <a:rPr lang="ru-RU" sz="1200" dirty="0" smtClean="0">
+                <a:latin typeface="Bahnschrift Light Condensed" panose="020B0502040204020203" pitchFamily="34" charset="0"/>
+              </a:rPr>
+              <a:t>Решение без результата</a:t>
+            </a:r>
+            <a:endParaRPr lang="ru-RU" sz="1200" dirty="0">
+              <a:latin typeface="Bahnschrift Light Condensed" panose="020B0502040204020203" pitchFamily="34" charset="0"/>
+            </a:endParaRPr>
+          </a:p>
+        </p:txBody>
+      </p:sp>
+      <p:cxnSp>
+        <p:nvCxnSpPr>
+          <p:cNvPr id="107" name="Прямая со стрелкой 106"/>
+          <p:cNvCxnSpPr/>
+          <p:nvPr/>
+        </p:nvCxnSpPr>
+        <p:spPr>
+          <a:xfrm flipH="1">
+            <a:off x="5810217" y="4545794"/>
+            <a:ext cx="1393083" cy="0"/>
+          </a:xfrm>
+          <a:prstGeom prst="straightConnector1">
+            <a:avLst/>
+          </a:prstGeom>
+          <a:ln w="9525">
+            <a:solidFill>
+              <a:schemeClr val="tx1"/>
+            </a:solidFill>
+            <a:prstDash val="dash"/>
+            <a:tailEnd type="arrow"/>
+          </a:ln>
+        </p:spPr>
+        <p:style>
+          <a:lnRef idx="1">
+            <a:schemeClr val="dk1"/>
+          </a:lnRef>
+          <a:fillRef idx="0">
+            <a:schemeClr val="dk1"/>
+          </a:fillRef>
+          <a:effectRef idx="0">
+            <a:schemeClr val="dk1"/>
+          </a:effectRef>
+          <a:fontRef idx="minor">
+            <a:schemeClr val="tx1"/>
+          </a:fontRef>
+        </p:style>
+      </p:cxnSp>
+      <p:sp>
+        <p:nvSpPr>
+          <p:cNvPr id="116" name="Прямоугольник 115"/>
+          <p:cNvSpPr/>
+          <p:nvPr/>
+        </p:nvSpPr>
+        <p:spPr>
+          <a:xfrm>
+            <a:off x="5582089" y="6364044"/>
+            <a:ext cx="196916" cy="677366"/>
+          </a:xfrm>
+          <a:prstGeom prst="rect">
+            <a:avLst/>
+          </a:prstGeom>
+          <a:solidFill>
+            <a:schemeClr val="bg1"/>
+          </a:solidFill>
+          <a:ln>
+            <a:solidFill>
+              <a:schemeClr val="tx1"/>
+            </a:solidFill>
+          </a:ln>
+        </p:spPr>
+        <p:style>
+          <a:lnRef idx="2">
+            <a:schemeClr val="accent1">
+              <a:shade val="50000"/>
+            </a:schemeClr>
+          </a:lnRef>
+          <a:fillRef idx="1">
+            <a:schemeClr val="accent1"/>
+          </a:fillRef>
+          <a:effectRef idx="0">
+            <a:schemeClr val="accent1"/>
+          </a:effectRef>
+          <a:fontRef idx="minor">
+            <a:schemeClr val="lt1"/>
+          </a:fontRef>
+        </p:style>
+        <p:txBody>
+          <a:bodyPr rtlCol="0" anchor="ctr"/>
+          <a:lstStyle/>
+          <a:p>
+            <a:pPr algn="ctr"/>
+            <a:endParaRPr lang="ru-RU"/>
+          </a:p>
+        </p:txBody>
+      </p:sp>
+      <p:sp>
+        <p:nvSpPr>
+          <p:cNvPr id="117" name="Прямоугольник 116"/>
+          <p:cNvSpPr/>
+          <p:nvPr/>
+        </p:nvSpPr>
+        <p:spPr>
+          <a:xfrm>
+            <a:off x="4034862" y="6364044"/>
+            <a:ext cx="144393" cy="748485"/>
+          </a:xfrm>
+          <a:prstGeom prst="rect">
+            <a:avLst/>
+          </a:prstGeom>
+          <a:solidFill>
+            <a:schemeClr val="bg1"/>
+          </a:solidFill>
+          <a:ln>
+            <a:solidFill>
+              <a:schemeClr val="tx1"/>
+            </a:solidFill>
+          </a:ln>
+        </p:spPr>
+        <p:style>
+          <a:lnRef idx="2">
+            <a:schemeClr val="accent1">
+              <a:shade val="50000"/>
+            </a:schemeClr>
+          </a:lnRef>
+          <a:fillRef idx="1">
+            <a:schemeClr val="accent1"/>
+          </a:fillRef>
+          <a:effectRef idx="0">
+            <a:schemeClr val="accent1"/>
+          </a:effectRef>
+          <a:fontRef idx="minor">
+            <a:schemeClr val="lt1"/>
+          </a:fontRef>
+        </p:style>
+        <p:txBody>
+          <a:bodyPr rtlCol="0" anchor="ctr"/>
+          <a:lstStyle/>
+          <a:p>
+            <a:pPr algn="ctr"/>
+            <a:endParaRPr lang="ru-RU"/>
+          </a:p>
+        </p:txBody>
+      </p:sp>
+      <p:cxnSp>
+        <p:nvCxnSpPr>
+          <p:cNvPr id="118" name="Прямая со стрелкой 117"/>
+          <p:cNvCxnSpPr/>
+          <p:nvPr/>
+        </p:nvCxnSpPr>
+        <p:spPr>
+          <a:xfrm flipV="1">
+            <a:off x="4185467" y="6458937"/>
+            <a:ext cx="1417237" cy="8853"/>
+          </a:xfrm>
+          <a:prstGeom prst="straightConnector1">
+            <a:avLst/>
+          </a:prstGeom>
+          <a:ln>
+            <a:tailEnd type="triangle"/>
+          </a:ln>
+        </p:spPr>
+        <p:style>
+          <a:lnRef idx="1">
+            <a:schemeClr val="dk1"/>
+          </a:lnRef>
+          <a:fillRef idx="0">
+            <a:schemeClr val="dk1"/>
+          </a:fillRef>
+          <a:effectRef idx="0">
+            <a:schemeClr val="dk1"/>
+          </a:effectRef>
+          <a:fontRef idx="minor">
+            <a:schemeClr val="tx1"/>
+          </a:fontRef>
+        </p:style>
+      </p:cxnSp>
+      <p:sp>
+        <p:nvSpPr>
+          <p:cNvPr id="119" name="TextBox 118"/>
+          <p:cNvSpPr txBox="1"/>
+          <p:nvPr/>
+        </p:nvSpPr>
+        <p:spPr>
+          <a:xfrm>
+            <a:off x="4461253" y="6446316"/>
+            <a:ext cx="844013" cy="276999"/>
+          </a:xfrm>
+          <a:prstGeom prst="rect">
+            <a:avLst/>
+          </a:prstGeom>
+          <a:noFill/>
+        </p:spPr>
+        <p:txBody>
+          <a:bodyPr wrap="square" rtlCol="0">
+            <a:spAutoFit/>
+          </a:bodyPr>
+          <a:lstStyle/>
+          <a:p>
+            <a:r>
+              <a:rPr lang="en-US" sz="1200" dirty="0" smtClean="0">
+                <a:latin typeface="Bahnschrift Light Condensed" panose="020B0502040204020203" pitchFamily="34" charset="0"/>
+              </a:rPr>
+              <a:t>ID</a:t>
+            </a:r>
+            <a:r>
+              <a:rPr lang="ru-RU" sz="1200" dirty="0" smtClean="0">
+                <a:latin typeface="Bahnschrift Light Condensed" panose="020B0502040204020203" pitchFamily="34" charset="0"/>
+              </a:rPr>
+              <a:t> решения</a:t>
+            </a:r>
+            <a:endParaRPr lang="ru-RU" sz="1200" dirty="0">
+              <a:latin typeface="Bahnschrift Light Condensed" panose="020B0502040204020203" pitchFamily="34" charset="0"/>
+            </a:endParaRPr>
+          </a:p>
+        </p:txBody>
+      </p:sp>
+      <p:cxnSp>
+        <p:nvCxnSpPr>
+          <p:cNvPr id="120" name="Прямая со стрелкой 119"/>
+          <p:cNvCxnSpPr/>
+          <p:nvPr/>
+        </p:nvCxnSpPr>
+        <p:spPr>
+          <a:xfrm flipH="1">
+            <a:off x="4197543" y="6977812"/>
+            <a:ext cx="1393083" cy="0"/>
+          </a:xfrm>
+          <a:prstGeom prst="straightConnector1">
+            <a:avLst/>
+          </a:prstGeom>
+          <a:ln w="9525">
+            <a:solidFill>
+              <a:schemeClr val="tx1"/>
+            </a:solidFill>
+            <a:prstDash val="dash"/>
+            <a:tailEnd type="arrow"/>
+          </a:ln>
+        </p:spPr>
+        <p:style>
+          <a:lnRef idx="1">
+            <a:schemeClr val="dk1"/>
+          </a:lnRef>
+          <a:fillRef idx="0">
+            <a:schemeClr val="dk1"/>
+          </a:fillRef>
+          <a:effectRef idx="0">
+            <a:schemeClr val="dk1"/>
+          </a:effectRef>
+          <a:fontRef idx="minor">
+            <a:schemeClr val="tx1"/>
+          </a:fontRef>
+        </p:style>
+      </p:cxnSp>
+      <p:sp>
+        <p:nvSpPr>
+          <p:cNvPr id="121" name="Прямоугольник 120"/>
+          <p:cNvSpPr/>
+          <p:nvPr/>
+        </p:nvSpPr>
+        <p:spPr>
+          <a:xfrm>
+            <a:off x="7221149" y="6341549"/>
+            <a:ext cx="196916" cy="668293"/>
+          </a:xfrm>
+          <a:prstGeom prst="rect">
+            <a:avLst/>
+          </a:prstGeom>
+          <a:solidFill>
+            <a:schemeClr val="bg1"/>
+          </a:solidFill>
+          <a:ln>
+            <a:solidFill>
+              <a:schemeClr val="tx1"/>
+            </a:solidFill>
+          </a:ln>
+        </p:spPr>
+        <p:style>
+          <a:lnRef idx="2">
+            <a:schemeClr val="accent1">
+              <a:shade val="50000"/>
+            </a:schemeClr>
+          </a:lnRef>
+          <a:fillRef idx="1">
+            <a:schemeClr val="accent1"/>
+          </a:fillRef>
+          <a:effectRef idx="0">
+            <a:schemeClr val="accent1"/>
+          </a:effectRef>
+          <a:fontRef idx="minor">
+            <a:schemeClr val="lt1"/>
+          </a:fontRef>
+        </p:style>
+        <p:txBody>
+          <a:bodyPr rtlCol="0" anchor="ctr"/>
+          <a:lstStyle/>
+          <a:p>
+            <a:pPr algn="ctr"/>
+            <a:endParaRPr lang="ru-RU"/>
+          </a:p>
+        </p:txBody>
+      </p:sp>
+      <p:cxnSp>
+        <p:nvCxnSpPr>
+          <p:cNvPr id="122" name="Прямая со стрелкой 121"/>
+          <p:cNvCxnSpPr/>
+          <p:nvPr/>
+        </p:nvCxnSpPr>
+        <p:spPr>
+          <a:xfrm flipV="1">
+            <a:off x="5818749" y="6420976"/>
+            <a:ext cx="1417237" cy="8853"/>
+          </a:xfrm>
+          <a:prstGeom prst="straightConnector1">
+            <a:avLst/>
+          </a:prstGeom>
+          <a:ln>
+            <a:tailEnd type="triangle"/>
+          </a:ln>
+        </p:spPr>
+        <p:style>
+          <a:lnRef idx="1">
+            <a:schemeClr val="dk1"/>
+          </a:lnRef>
+          <a:fillRef idx="0">
+            <a:schemeClr val="dk1"/>
+          </a:fillRef>
+          <a:effectRef idx="0">
+            <a:schemeClr val="dk1"/>
+          </a:effectRef>
+          <a:fontRef idx="minor">
+            <a:schemeClr val="tx1"/>
+          </a:fontRef>
+        </p:style>
+      </p:cxnSp>
+      <p:sp>
+        <p:nvSpPr>
+          <p:cNvPr id="123" name="TextBox 122"/>
+          <p:cNvSpPr txBox="1"/>
+          <p:nvPr/>
+        </p:nvSpPr>
+        <p:spPr>
+          <a:xfrm>
+            <a:off x="6065091" y="6408355"/>
+            <a:ext cx="873458" cy="276999"/>
+          </a:xfrm>
+          <a:prstGeom prst="rect">
+            <a:avLst/>
+          </a:prstGeom>
+          <a:noFill/>
+        </p:spPr>
+        <p:txBody>
+          <a:bodyPr wrap="square" rtlCol="0">
+            <a:spAutoFit/>
+          </a:bodyPr>
+          <a:lstStyle/>
+          <a:p>
+            <a:r>
+              <a:rPr lang="en-US" sz="1200" dirty="0" smtClean="0">
+                <a:latin typeface="Bahnschrift Light Condensed" panose="020B0502040204020203" pitchFamily="34" charset="0"/>
+              </a:rPr>
+              <a:t>ID </a:t>
+            </a:r>
+            <a:r>
+              <a:rPr lang="ru-RU" sz="1200" dirty="0" smtClean="0">
+                <a:latin typeface="Bahnschrift Light Condensed" panose="020B0502040204020203" pitchFamily="34" charset="0"/>
+              </a:rPr>
+              <a:t>решения</a:t>
+            </a:r>
+          </a:p>
+        </p:txBody>
+      </p:sp>
+      <p:cxnSp>
+        <p:nvCxnSpPr>
+          <p:cNvPr id="124" name="Прямая со стрелкой 123"/>
+          <p:cNvCxnSpPr/>
+          <p:nvPr/>
+        </p:nvCxnSpPr>
+        <p:spPr>
+          <a:xfrm flipH="1">
+            <a:off x="5798441" y="6949163"/>
+            <a:ext cx="1393083" cy="0"/>
+          </a:xfrm>
+          <a:prstGeom prst="straightConnector1">
+            <a:avLst/>
+          </a:prstGeom>
+          <a:ln w="9525">
+            <a:solidFill>
+              <a:schemeClr val="tx1"/>
+            </a:solidFill>
+            <a:prstDash val="dash"/>
+            <a:tailEnd type="arrow"/>
+          </a:ln>
+        </p:spPr>
+        <p:style>
+          <a:lnRef idx="1">
+            <a:schemeClr val="dk1"/>
+          </a:lnRef>
+          <a:fillRef idx="0">
+            <a:schemeClr val="dk1"/>
+          </a:fillRef>
+          <a:effectRef idx="0">
+            <a:schemeClr val="dk1"/>
+          </a:effectRef>
+          <a:fontRef idx="minor">
+            <a:schemeClr val="tx1"/>
+          </a:fontRef>
+        </p:style>
+      </p:cxnSp>
+      <p:sp>
+        <p:nvSpPr>
+          <p:cNvPr id="137" name="TextBox 136"/>
+          <p:cNvSpPr txBox="1"/>
+          <p:nvPr/>
+        </p:nvSpPr>
+        <p:spPr>
+          <a:xfrm>
+            <a:off x="6026921" y="6956711"/>
+            <a:ext cx="1318340" cy="461665"/>
+          </a:xfrm>
+          <a:prstGeom prst="rect">
+            <a:avLst/>
+          </a:prstGeom>
+          <a:noFill/>
+        </p:spPr>
+        <p:txBody>
+          <a:bodyPr wrap="square" rtlCol="0">
+            <a:spAutoFit/>
+          </a:bodyPr>
+          <a:lstStyle/>
+          <a:p>
+            <a:r>
+              <a:rPr lang="ru-RU" sz="1200" dirty="0" smtClean="0">
+                <a:latin typeface="Bahnschrift Light Condensed" panose="020B0502040204020203" pitchFamily="34" charset="0"/>
+              </a:rPr>
+              <a:t>Решение с результатом</a:t>
+            </a:r>
+            <a:endParaRPr lang="ru-RU" sz="1200" dirty="0">
+              <a:latin typeface="Bahnschrift Light Condensed" panose="020B0502040204020203" pitchFamily="34" charset="0"/>
+            </a:endParaRPr>
+          </a:p>
+        </p:txBody>
+      </p:sp>
+      <p:sp>
+        <p:nvSpPr>
+          <p:cNvPr id="139" name="TextBox 138"/>
+          <p:cNvSpPr txBox="1"/>
+          <p:nvPr/>
+        </p:nvSpPr>
+        <p:spPr>
+          <a:xfrm>
+            <a:off x="4305477" y="4580007"/>
+            <a:ext cx="1232278" cy="461665"/>
+          </a:xfrm>
+          <a:prstGeom prst="rect">
+            <a:avLst/>
+          </a:prstGeom>
+          <a:noFill/>
+        </p:spPr>
+        <p:txBody>
+          <a:bodyPr wrap="square" rtlCol="0">
+            <a:spAutoFit/>
+          </a:bodyPr>
+          <a:lstStyle/>
+          <a:p>
+            <a:r>
+              <a:rPr lang="ru-RU" sz="1200" dirty="0" smtClean="0">
+                <a:latin typeface="Bahnschrift Light Condensed" panose="020B0502040204020203" pitchFamily="34" charset="0"/>
+              </a:rPr>
+              <a:t>Решение без результата</a:t>
+            </a:r>
+            <a:endParaRPr lang="ru-RU" sz="1200" dirty="0">
+              <a:latin typeface="Bahnschrift Light Condensed" panose="020B0502040204020203" pitchFamily="34" charset="0"/>
+            </a:endParaRPr>
           </a:p>
         </p:txBody>
       </p:sp>
@@ -7364,13 +8138,13 @@
   <p:clrMapOvr>
     <a:masterClrMapping/>
   </p:clrMapOvr>
-  <mc:AlternateContent xmlns:mc="http://schemas.openxmlformats.org/markup-compatibility/2006">
-    <mc:Choice xmlns:p14="http://schemas.microsoft.com/office/powerpoint/2010/main" Requires="p14">
+  <mc:AlternateContent xmlns:mc="http://schemas.openxmlformats.org/markup-compatibility/2006" xmlns:p14="http://schemas.microsoft.com/office/powerpoint/2010/main">
+    <mc:Choice Requires="p14">
       <p:transition>
         <p14:reveal/>
       </p:transition>
     </mc:Choice>
-    <mc:Fallback>
+    <mc:Fallback xmlns="">
       <p:transition>
         <p:fade/>
       </p:transition>
@@ -7622,7 +8396,7 @@
                                 </p:cTn>
                               </p:par>
                               <p:par>
-                                <p:cTn id="23" presetID="1" presetClass="entr" presetSubtype="0" fill="hold" grpId="0" nodeType="withEffect">
+                                <p:cTn id="23" presetID="1" presetClass="entr" presetSubtype="0" fill="hold" nodeType="withEffect">
                                   <p:stCondLst>
                                     <p:cond delay="0"/>
                                   </p:stCondLst>
@@ -7630,33 +8404,6 @@
                                     <p:set>
                                       <p:cBhvr>
                                         <p:cTn id="24" dur="1" fill="hold">
-                                          <p:stCondLst>
-                                            <p:cond delay="0"/>
-                                          </p:stCondLst>
-                                        </p:cTn>
-                                        <p:tgtEl>
-                                          <p:spTgt spid="23"/>
-                                        </p:tgtEl>
-                                        <p:attrNameLst>
-                                          <p:attrName>style.visibility</p:attrName>
-                                        </p:attrNameLst>
-                                      </p:cBhvr>
-                                      <p:to>
-                                        <p:strVal val="visible"/>
-                                      </p:to>
-                                    </p:set>
-                                  </p:childTnLst>
-                                </p:cTn>
-                              </p:par>
-                              <p:par>
-                                <p:cTn id="25" presetID="1" presetClass="entr" presetSubtype="0" fill="hold" nodeType="withEffect">
-                                  <p:stCondLst>
-                                    <p:cond delay="0"/>
-                                  </p:stCondLst>
-                                  <p:childTnLst>
-                                    <p:set>
-                                      <p:cBhvr>
-                                        <p:cTn id="26" dur="1" fill="hold">
                                           <p:stCondLst>
                                             <p:cond delay="0"/>
                                           </p:stCondLst>
@@ -7676,7 +8423,34 @@
                                 </p:cTn>
                               </p:par>
                               <p:par>
-                                <p:cTn id="27" presetID="1" presetClass="entr" presetSubtype="0" fill="hold" nodeType="withEffect">
+                                <p:cTn id="25" presetID="1" presetClass="entr" presetSubtype="0" fill="hold" grpId="0" nodeType="withEffect">
+                                  <p:stCondLst>
+                                    <p:cond delay="0"/>
+                                  </p:stCondLst>
+                                  <p:childTnLst>
+                                    <p:set>
+                                      <p:cBhvr>
+                                        <p:cTn id="26" dur="1" fill="hold">
+                                          <p:stCondLst>
+                                            <p:cond delay="0"/>
+                                          </p:stCondLst>
+                                        </p:cTn>
+                                        <p:tgtEl>
+                                          <p:spTgt spid="21"/>
+                                        </p:tgtEl>
+                                        <p:attrNameLst>
+                                          <p:attrName>style.visibility</p:attrName>
+                                        </p:attrNameLst>
+                                      </p:cBhvr>
+                                      <p:to>
+                                        <p:strVal val="visible"/>
+                                      </p:to>
+                                    </p:set>
+                                  </p:childTnLst>
+                                </p:cTn>
+                              </p:par>
+                              <p:par>
+                                <p:cTn id="27" presetID="1" presetClass="entr" presetSubtype="0" fill="hold" grpId="0" nodeType="withEffect">
                                   <p:stCondLst>
                                     <p:cond delay="0"/>
                                   </p:stCondLst>
@@ -7689,7 +8463,7 @@
                                           </p:stCondLst>
                                         </p:cTn>
                                         <p:tgtEl>
-                                          <p:spTgt spid="28"/>
+                                          <p:spTgt spid="32"/>
                                         </p:tgtEl>
                                         <p:attrNameLst>
                                           <p:attrName>style.visibility</p:attrName>
@@ -7716,34 +8490,7 @@
                                           </p:stCondLst>
                                         </p:cTn>
                                         <p:tgtEl>
-                                          <p:spTgt spid="21"/>
-                                        </p:tgtEl>
-                                        <p:attrNameLst>
-                                          <p:attrName>style.visibility</p:attrName>
-                                        </p:attrNameLst>
-                                      </p:cBhvr>
-                                      <p:to>
-                                        <p:strVal val="visible"/>
-                                      </p:to>
-                                    </p:set>
-                                  </p:childTnLst>
-                                </p:cTn>
-                              </p:par>
-                              <p:par>
-                                <p:cTn id="31" presetID="1" presetClass="entr" presetSubtype="0" fill="hold" grpId="0" nodeType="withEffect">
-                                  <p:stCondLst>
-                                    <p:cond delay="0"/>
-                                  </p:stCondLst>
-                                  <p:childTnLst>
-                                    <p:set>
-                                      <p:cBhvr>
-                                        <p:cTn id="32" dur="1" fill="hold">
-                                          <p:stCondLst>
-                                            <p:cond delay="0"/>
-                                          </p:stCondLst>
-                                        </p:cTn>
-                                        <p:tgtEl>
-                                          <p:spTgt spid="32"/>
+                                          <p:spTgt spid="35"/>
                                         </p:tgtEl>
                                         <p:attrNameLst>
                                           <p:attrName>style.visibility</p:attrName>
@@ -7763,32 +8510,32 @@
                     </p:cTn>
                   </p:par>
                   <p:par>
-                    <p:cTn id="33" fill="hold">
+                    <p:cTn id="31" fill="hold">
                       <p:stCondLst>
                         <p:cond delay="indefinite"/>
                       </p:stCondLst>
                       <p:childTnLst>
                         <p:par>
-                          <p:cTn id="34" fill="hold">
+                          <p:cTn id="32" fill="hold">
                             <p:stCondLst>
                               <p:cond delay="0"/>
                             </p:stCondLst>
                             <p:childTnLst>
                               <p:par>
-                                <p:cTn id="35" presetID="1" presetClass="entr" presetSubtype="0" fill="hold" grpId="0" nodeType="clickEffect">
+                                <p:cTn id="33" presetID="1" presetClass="entr" presetSubtype="0" fill="hold" grpId="0" nodeType="clickEffect">
                                   <p:stCondLst>
                                     <p:cond delay="0"/>
                                   </p:stCondLst>
                                   <p:childTnLst>
                                     <p:set>
                                       <p:cBhvr>
-                                        <p:cTn id="36" dur="1" fill="hold">
+                                        <p:cTn id="34" dur="1" fill="hold">
                                           <p:stCondLst>
                                             <p:cond delay="0"/>
                                           </p:stCondLst>
                                         </p:cTn>
                                         <p:tgtEl>
-                                          <p:spTgt spid="37"/>
+                                          <p:spTgt spid="73"/>
                                         </p:tgtEl>
                                         <p:attrNameLst>
                                           <p:attrName>style.visibility</p:attrName>
@@ -7802,20 +8549,20 @@
                                 </p:cTn>
                               </p:par>
                               <p:par>
-                                <p:cTn id="37" presetID="1" presetClass="entr" presetSubtype="0" fill="hold" nodeType="withEffect">
+                                <p:cTn id="35" presetID="1" presetClass="entr" presetSubtype="0" fill="hold" grpId="0" nodeType="withEffect">
                                   <p:stCondLst>
                                     <p:cond delay="0"/>
                                   </p:stCondLst>
                                   <p:childTnLst>
                                     <p:set>
                                       <p:cBhvr>
-                                        <p:cTn id="38" dur="1" fill="hold">
+                                        <p:cTn id="36" dur="1" fill="hold">
                                           <p:stCondLst>
                                             <p:cond delay="0"/>
                                           </p:stCondLst>
                                         </p:cTn>
                                         <p:tgtEl>
-                                          <p:spTgt spid="36"/>
+                                          <p:spTgt spid="50"/>
                                         </p:tgtEl>
                                         <p:attrNameLst>
                                           <p:attrName>style.visibility</p:attrName>
@@ -7829,7 +8576,34 @@
                                 </p:cTn>
                               </p:par>
                               <p:par>
-                                <p:cTn id="39" presetID="1" presetClass="entr" presetSubtype="0" fill="hold" grpId="0" nodeType="withEffect">
+                                <p:cTn id="37" presetID="1" presetClass="entr" presetSubtype="0" fill="hold" grpId="0" nodeType="withEffect">
+                                  <p:stCondLst>
+                                    <p:cond delay="0"/>
+                                  </p:stCondLst>
+                                  <p:childTnLst>
+                                    <p:set>
+                                      <p:cBhvr>
+                                        <p:cTn id="38" dur="1" fill="hold">
+                                          <p:stCondLst>
+                                            <p:cond delay="0"/>
+                                          </p:stCondLst>
+                                        </p:cTn>
+                                        <p:tgtEl>
+                                          <p:spTgt spid="57"/>
+                                        </p:tgtEl>
+                                        <p:attrNameLst>
+                                          <p:attrName>style.visibility</p:attrName>
+                                        </p:attrNameLst>
+                                      </p:cBhvr>
+                                      <p:to>
+                                        <p:strVal val="visible"/>
+                                      </p:to>
+                                    </p:set>
+                                  </p:childTnLst>
+                                </p:cTn>
+                              </p:par>
+                              <p:par>
+                                <p:cTn id="39" presetID="1" presetClass="entr" presetSubtype="0" fill="hold" nodeType="withEffect">
                                   <p:stCondLst>
                                     <p:cond delay="0"/>
                                   </p:stCondLst>
@@ -7842,7 +8616,7 @@
                                           </p:stCondLst>
                                         </p:cTn>
                                         <p:tgtEl>
-                                          <p:spTgt spid="35"/>
+                                          <p:spTgt spid="60"/>
                                         </p:tgtEl>
                                         <p:attrNameLst>
                                           <p:attrName>style.visibility</p:attrName>
@@ -7887,7 +8661,7 @@
                                           </p:stCondLst>
                                         </p:cTn>
                                         <p:tgtEl>
-                                          <p:spTgt spid="42"/>
+                                          <p:spTgt spid="64"/>
                                         </p:tgtEl>
                                         <p:attrNameLst>
                                           <p:attrName>style.visibility</p:attrName>
@@ -7914,52 +8688,7 @@
                                           </p:stCondLst>
                                         </p:cTn>
                                         <p:tgtEl>
-                                          <p:spTgt spid="40"/>
-                                        </p:tgtEl>
-                                        <p:attrNameLst>
-                                          <p:attrName>style.visibility</p:attrName>
-                                        </p:attrNameLst>
-                                      </p:cBhvr>
-                                      <p:to>
-                                        <p:strVal val="visible"/>
-                                      </p:to>
-                                    </p:set>
-                                  </p:childTnLst>
-                                </p:cTn>
-                              </p:par>
-                            </p:childTnLst>
-                          </p:cTn>
-                        </p:par>
-                      </p:childTnLst>
-                    </p:cTn>
-                  </p:par>
-                  <p:par>
-                    <p:cTn id="47" fill="hold">
-                      <p:stCondLst>
-                        <p:cond delay="indefinite"/>
-                      </p:stCondLst>
-                      <p:childTnLst>
-                        <p:par>
-                          <p:cTn id="48" fill="hold">
-                            <p:stCondLst>
-                              <p:cond delay="0"/>
-                            </p:stCondLst>
-                            <p:childTnLst>
-                              <p:par>
-                                <p:cTn id="49" presetID="1" presetClass="entr" presetSubtype="0" fill="hold" grpId="0" nodeType="clickEffect">
-                                  <p:stCondLst>
-                                    <p:cond delay="0"/>
-                                  </p:stCondLst>
-                                  <p:childTnLst>
-                                    <p:set>
-                                      <p:cBhvr>
-                                        <p:cTn id="50" dur="1" fill="hold">
-                                          <p:stCondLst>
-                                            <p:cond delay="0"/>
-                                          </p:stCondLst>
-                                        </p:cTn>
-                                        <p:tgtEl>
-                                          <p:spTgt spid="73"/>
+                                          <p:spTgt spid="63"/>
                                         </p:tgtEl>
                                         <p:attrNameLst>
                                           <p:attrName>style.visibility</p:attrName>
@@ -7973,20 +8702,20 @@
                                 </p:cTn>
                               </p:par>
                               <p:par>
-                                <p:cTn id="51" presetID="1" presetClass="entr" presetSubtype="0" fill="hold" grpId="0" nodeType="withEffect">
+                                <p:cTn id="47" presetID="1" presetClass="entr" presetSubtype="0" fill="hold" grpId="0" nodeType="withEffect">
                                   <p:stCondLst>
                                     <p:cond delay="0"/>
                                   </p:stCondLst>
                                   <p:childTnLst>
                                     <p:set>
                                       <p:cBhvr>
-                                        <p:cTn id="52" dur="1" fill="hold">
+                                        <p:cTn id="48" dur="1" fill="hold">
                                           <p:stCondLst>
                                             <p:cond delay="0"/>
                                           </p:stCondLst>
                                         </p:cTn>
                                         <p:tgtEl>
-                                          <p:spTgt spid="52"/>
+                                          <p:spTgt spid="65"/>
                                         </p:tgtEl>
                                         <p:attrNameLst>
                                           <p:attrName>style.visibility</p:attrName>
@@ -8000,20 +8729,20 @@
                                 </p:cTn>
                               </p:par>
                               <p:par>
-                                <p:cTn id="53" presetID="1" presetClass="entr" presetSubtype="0" fill="hold" nodeType="withEffect">
+                                <p:cTn id="49" presetID="1" presetClass="entr" presetSubtype="0" fill="hold" grpId="0" nodeType="withEffect">
                                   <p:stCondLst>
                                     <p:cond delay="0"/>
                                   </p:stCondLst>
                                   <p:childTnLst>
                                     <p:set>
                                       <p:cBhvr>
-                                        <p:cTn id="54" dur="1" fill="hold">
+                                        <p:cTn id="50" dur="1" fill="hold">
                                           <p:stCondLst>
                                             <p:cond delay="0"/>
                                           </p:stCondLst>
                                         </p:cTn>
                                         <p:tgtEl>
-                                          <p:spTgt spid="51"/>
+                                          <p:spTgt spid="71"/>
                                         </p:tgtEl>
                                         <p:attrNameLst>
                                           <p:attrName>style.visibility</p:attrName>
@@ -8027,20 +8756,20 @@
                                 </p:cTn>
                               </p:par>
                               <p:par>
-                                <p:cTn id="55" presetID="1" presetClass="entr" presetSubtype="0" fill="hold" grpId="0" nodeType="withEffect">
+                                <p:cTn id="51" presetID="1" presetClass="entr" presetSubtype="0" fill="hold" nodeType="withEffect">
                                   <p:stCondLst>
                                     <p:cond delay="0"/>
                                   </p:stCondLst>
                                   <p:childTnLst>
                                     <p:set>
                                       <p:cBhvr>
-                                        <p:cTn id="56" dur="1" fill="hold">
+                                        <p:cTn id="52" dur="1" fill="hold">
                                           <p:stCondLst>
                                             <p:cond delay="0"/>
                                           </p:stCondLst>
                                         </p:cTn>
                                         <p:tgtEl>
-                                          <p:spTgt spid="50"/>
+                                          <p:spTgt spid="74"/>
                                         </p:tgtEl>
                                         <p:attrNameLst>
                                           <p:attrName>style.visibility</p:attrName>
@@ -8054,7 +8783,61 @@
                                 </p:cTn>
                               </p:par>
                               <p:par>
-                                <p:cTn id="57" presetID="1" presetClass="entr" presetSubtype="0" fill="hold" nodeType="withEffect">
+                                <p:cTn id="53" presetID="1" presetClass="entr" presetSubtype="0" fill="hold" grpId="0" nodeType="withEffect">
+                                  <p:stCondLst>
+                                    <p:cond delay="0"/>
+                                  </p:stCondLst>
+                                  <p:childTnLst>
+                                    <p:set>
+                                      <p:cBhvr>
+                                        <p:cTn id="54" dur="1" fill="hold">
+                                          <p:stCondLst>
+                                            <p:cond delay="0"/>
+                                          </p:stCondLst>
+                                        </p:cTn>
+                                        <p:tgtEl>
+                                          <p:spTgt spid="76"/>
+                                        </p:tgtEl>
+                                        <p:attrNameLst>
+                                          <p:attrName>style.visibility</p:attrName>
+                                        </p:attrNameLst>
+                                      </p:cBhvr>
+                                      <p:to>
+                                        <p:strVal val="visible"/>
+                                      </p:to>
+                                    </p:set>
+                                  </p:childTnLst>
+                                </p:cTn>
+                              </p:par>
+                              <p:par>
+                                <p:cTn id="55" presetID="1" presetClass="entr" presetSubtype="0" fill="hold" nodeType="withEffect">
+                                  <p:stCondLst>
+                                    <p:cond delay="0"/>
+                                  </p:stCondLst>
+                                  <p:childTnLst>
+                                    <p:set>
+                                      <p:cBhvr>
+                                        <p:cTn id="56" dur="1" fill="hold">
+                                          <p:stCondLst>
+                                            <p:cond delay="0"/>
+                                          </p:stCondLst>
+                                        </p:cTn>
+                                        <p:tgtEl>
+                                          <p:spTgt spid="77"/>
+                                        </p:tgtEl>
+                                        <p:attrNameLst>
+                                          <p:attrName>style.visibility</p:attrName>
+                                        </p:attrNameLst>
+                                      </p:cBhvr>
+                                      <p:to>
+                                        <p:strVal val="visible"/>
+                                      </p:to>
+                                    </p:set>
+                                  </p:childTnLst>
+                                </p:cTn>
+                              </p:par>
+                              <p:par>
+                                <p:cTn id="57" presetID="1" presetClass="entr" presetSubtype="0" fill="hold" grpId="0" nodeType="withEffect">
                                   <p:stCondLst>
                                     <p:cond delay="0"/>
                                   </p:stCondLst>
@@ -8067,7 +8850,7 @@
                                           </p:stCondLst>
                                         </p:cTn>
                                         <p:tgtEl>
-                                          <p:spTgt spid="53"/>
+                                          <p:spTgt spid="78"/>
                                         </p:tgtEl>
                                         <p:attrNameLst>
                                           <p:attrName>style.visibility</p:attrName>
@@ -8094,52 +8877,7 @@
                                           </p:stCondLst>
                                         </p:cTn>
                                         <p:tgtEl>
-                                          <p:spTgt spid="54"/>
-                                        </p:tgtEl>
-                                        <p:attrNameLst>
-                                          <p:attrName>style.visibility</p:attrName>
-                                        </p:attrNameLst>
-                                      </p:cBhvr>
-                                      <p:to>
-                                        <p:strVal val="visible"/>
-                                      </p:to>
-                                    </p:set>
-                                  </p:childTnLst>
-                                </p:cTn>
-                              </p:par>
-                            </p:childTnLst>
-                          </p:cTn>
-                        </p:par>
-                      </p:childTnLst>
-                    </p:cTn>
-                  </p:par>
-                  <p:par>
-                    <p:cTn id="61" fill="hold">
-                      <p:stCondLst>
-                        <p:cond delay="indefinite"/>
-                      </p:stCondLst>
-                      <p:childTnLst>
-                        <p:par>
-                          <p:cTn id="62" fill="hold">
-                            <p:stCondLst>
-                              <p:cond delay="0"/>
-                            </p:stCondLst>
-                            <p:childTnLst>
-                              <p:par>
-                                <p:cTn id="63" presetID="1" presetClass="entr" presetSubtype="0" fill="hold" grpId="0" nodeType="clickEffect">
-                                  <p:stCondLst>
-                                    <p:cond delay="0"/>
-                                  </p:stCondLst>
-                                  <p:childTnLst>
-                                    <p:set>
-                                      <p:cBhvr>
-                                        <p:cTn id="64" dur="1" fill="hold">
-                                          <p:stCondLst>
-                                            <p:cond delay="0"/>
-                                          </p:stCondLst>
-                                        </p:cTn>
-                                        <p:tgtEl>
-                                          <p:spTgt spid="49"/>
+                                          <p:spTgt spid="79"/>
                                         </p:tgtEl>
                                         <p:attrNameLst>
                                           <p:attrName>style.visibility</p:attrName>
@@ -8153,20 +8891,20 @@
                                 </p:cTn>
                               </p:par>
                               <p:par>
-                                <p:cTn id="65" presetID="1" presetClass="entr" presetSubtype="0" fill="hold" nodeType="withEffect">
+                                <p:cTn id="61" presetID="1" presetClass="entr" presetSubtype="0" fill="hold" nodeType="withEffect">
                                   <p:stCondLst>
                                     <p:cond delay="0"/>
                                   </p:stCondLst>
                                   <p:childTnLst>
                                     <p:set>
                                       <p:cBhvr>
-                                        <p:cTn id="66" dur="1" fill="hold">
+                                        <p:cTn id="62" dur="1" fill="hold">
                                           <p:stCondLst>
                                             <p:cond delay="0"/>
                                           </p:stCondLst>
                                         </p:cTn>
                                         <p:tgtEl>
-                                          <p:spTgt spid="47"/>
+                                          <p:spTgt spid="80"/>
                                         </p:tgtEl>
                                         <p:attrNameLst>
                                           <p:attrName>style.visibility</p:attrName>
@@ -8180,7 +8918,61 @@
                                 </p:cTn>
                               </p:par>
                               <p:par>
-                                <p:cTn id="67" presetID="1" presetClass="entr" presetSubtype="0" fill="hold" grpId="0" nodeType="withEffect">
+                                <p:cTn id="63" presetID="1" presetClass="entr" presetSubtype="0" fill="hold" nodeType="withEffect">
+                                  <p:stCondLst>
+                                    <p:cond delay="0"/>
+                                  </p:stCondLst>
+                                  <p:childTnLst>
+                                    <p:set>
+                                      <p:cBhvr>
+                                        <p:cTn id="64" dur="1" fill="hold">
+                                          <p:stCondLst>
+                                            <p:cond delay="0"/>
+                                          </p:stCondLst>
+                                        </p:cTn>
+                                        <p:tgtEl>
+                                          <p:spTgt spid="81"/>
+                                        </p:tgtEl>
+                                        <p:attrNameLst>
+                                          <p:attrName>style.visibility</p:attrName>
+                                        </p:attrNameLst>
+                                      </p:cBhvr>
+                                      <p:to>
+                                        <p:strVal val="visible"/>
+                                      </p:to>
+                                    </p:set>
+                                  </p:childTnLst>
+                                </p:cTn>
+                              </p:par>
+                              <p:par>
+                                <p:cTn id="65" presetID="1" presetClass="entr" presetSubtype="0" fill="hold" grpId="0" nodeType="withEffect">
+                                  <p:stCondLst>
+                                    <p:cond delay="0"/>
+                                  </p:stCondLst>
+                                  <p:childTnLst>
+                                    <p:set>
+                                      <p:cBhvr>
+                                        <p:cTn id="66" dur="1" fill="hold">
+                                          <p:stCondLst>
+                                            <p:cond delay="0"/>
+                                          </p:stCondLst>
+                                        </p:cTn>
+                                        <p:tgtEl>
+                                          <p:spTgt spid="85"/>
+                                        </p:tgtEl>
+                                        <p:attrNameLst>
+                                          <p:attrName>style.visibility</p:attrName>
+                                        </p:attrNameLst>
+                                      </p:cBhvr>
+                                      <p:to>
+                                        <p:strVal val="visible"/>
+                                      </p:to>
+                                    </p:set>
+                                  </p:childTnLst>
+                                </p:cTn>
+                              </p:par>
+                              <p:par>
+                                <p:cTn id="67" presetID="1" presetClass="entr" presetSubtype="0" fill="hold" nodeType="withEffect">
                                   <p:stCondLst>
                                     <p:cond delay="0"/>
                                   </p:stCondLst>
@@ -8193,7 +8985,7 @@
                                           </p:stCondLst>
                                         </p:cTn>
                                         <p:tgtEl>
-                                          <p:spTgt spid="46"/>
+                                          <p:spTgt spid="86"/>
                                         </p:tgtEl>
                                         <p:attrNameLst>
                                           <p:attrName>style.visibility</p:attrName>
@@ -8206,26 +8998,35 @@
                                   </p:childTnLst>
                                 </p:cTn>
                               </p:par>
-                            </p:childTnLst>
-                          </p:cTn>
-                        </p:par>
-                      </p:childTnLst>
-                    </p:cTn>
-                  </p:par>
-                  <p:par>
-                    <p:cTn id="69" fill="hold">
-                      <p:stCondLst>
-                        <p:cond delay="indefinite"/>
-                      </p:stCondLst>
-                      <p:childTnLst>
-                        <p:par>
-                          <p:cTn id="70" fill="hold">
-                            <p:stCondLst>
-                              <p:cond delay="0"/>
-                            </p:stCondLst>
-                            <p:childTnLst>
                               <p:par>
-                                <p:cTn id="71" presetID="1" presetClass="entr" presetSubtype="0" fill="hold" grpId="0" nodeType="clickEffect">
+                                <p:cTn id="69" presetID="1" presetClass="entr" presetSubtype="0" fill="hold" grpId="0" nodeType="withEffect">
+                                  <p:stCondLst>
+                                    <p:cond delay="0"/>
+                                  </p:stCondLst>
+                                  <p:childTnLst>
+                                    <p:set>
+                                      <p:cBhvr>
+                                        <p:cTn id="70" dur="1" fill="hold">
+                                          <p:stCondLst>
+                                            <p:cond delay="0"/>
+                                          </p:stCondLst>
+                                        </p:cTn>
+                                        <p:tgtEl>
+                                          <p:spTgt spid="87"/>
+                                        </p:tgtEl>
+                                        <p:attrNameLst>
+                                          <p:attrName>style.visibility</p:attrName>
+                                        </p:attrNameLst>
+                                      </p:cBhvr>
+                                      <p:to>
+                                        <p:strVal val="visible"/>
+                                      </p:to>
+                                    </p:set>
+                                  </p:childTnLst>
+                                </p:cTn>
+                              </p:par>
+                              <p:par>
+                                <p:cTn id="71" presetID="1" presetClass="entr" presetSubtype="0" fill="hold" grpId="0" nodeType="withEffect">
                                   <p:stCondLst>
                                     <p:cond delay="0"/>
                                   </p:stCondLst>
@@ -8238,7 +9039,7 @@
                                           </p:stCondLst>
                                         </p:cTn>
                                         <p:tgtEl>
-                                          <p:spTgt spid="59"/>
+                                          <p:spTgt spid="88"/>
                                         </p:tgtEl>
                                         <p:attrNameLst>
                                           <p:attrName>style.visibility</p:attrName>
@@ -8265,7 +9066,7 @@
                                           </p:stCondLst>
                                         </p:cTn>
                                         <p:tgtEl>
-                                          <p:spTgt spid="58"/>
+                                          <p:spTgt spid="89"/>
                                         </p:tgtEl>
                                         <p:attrNameLst>
                                           <p:attrName>style.visibility</p:attrName>
@@ -8279,7 +9080,7 @@
                                 </p:cTn>
                               </p:par>
                               <p:par>
-                                <p:cTn id="75" presetID="1" presetClass="entr" presetSubtype="0" fill="hold" grpId="0" nodeType="withEffect">
+                                <p:cTn id="75" presetID="1" presetClass="entr" presetSubtype="0" fill="hold" nodeType="withEffect">
                                   <p:stCondLst>
                                     <p:cond delay="0"/>
                                   </p:stCondLst>
@@ -8292,7 +9093,7 @@
                                           </p:stCondLst>
                                         </p:cTn>
                                         <p:tgtEl>
-                                          <p:spTgt spid="57"/>
+                                          <p:spTgt spid="90"/>
                                         </p:tgtEl>
                                         <p:attrNameLst>
                                           <p:attrName>style.visibility</p:attrName>
@@ -8306,7 +9107,7 @@
                                 </p:cTn>
                               </p:par>
                               <p:par>
-                                <p:cTn id="77" presetID="1" presetClass="entr" presetSubtype="0" fill="hold" nodeType="withEffect">
+                                <p:cTn id="77" presetID="1" presetClass="entr" presetSubtype="0" fill="hold" grpId="0" nodeType="withEffect">
                                   <p:stCondLst>
                                     <p:cond delay="0"/>
                                   </p:stCondLst>
@@ -8319,7 +9120,7 @@
                                           </p:stCondLst>
                                         </p:cTn>
                                         <p:tgtEl>
-                                          <p:spTgt spid="60"/>
+                                          <p:spTgt spid="94"/>
                                         </p:tgtEl>
                                         <p:attrNameLst>
                                           <p:attrName>style.visibility</p:attrName>
@@ -8346,7 +9147,196 @@
                                           </p:stCondLst>
                                         </p:cTn>
                                         <p:tgtEl>
-                                          <p:spTgt spid="61"/>
+                                          <p:spTgt spid="95"/>
+                                        </p:tgtEl>
+                                        <p:attrNameLst>
+                                          <p:attrName>style.visibility</p:attrName>
+                                        </p:attrNameLst>
+                                      </p:cBhvr>
+                                      <p:to>
+                                        <p:strVal val="visible"/>
+                                      </p:to>
+                                    </p:set>
+                                  </p:childTnLst>
+                                </p:cTn>
+                              </p:par>
+                              <p:par>
+                                <p:cTn id="81" presetID="1" presetClass="entr" presetSubtype="0" fill="hold" nodeType="withEffect">
+                                  <p:stCondLst>
+                                    <p:cond delay="0"/>
+                                  </p:stCondLst>
+                                  <p:childTnLst>
+                                    <p:set>
+                                      <p:cBhvr>
+                                        <p:cTn id="82" dur="1" fill="hold">
+                                          <p:stCondLst>
+                                            <p:cond delay="0"/>
+                                          </p:stCondLst>
+                                        </p:cTn>
+                                        <p:tgtEl>
+                                          <p:spTgt spid="96"/>
+                                        </p:tgtEl>
+                                        <p:attrNameLst>
+                                          <p:attrName>style.visibility</p:attrName>
+                                        </p:attrNameLst>
+                                      </p:cBhvr>
+                                      <p:to>
+                                        <p:strVal val="visible"/>
+                                      </p:to>
+                                    </p:set>
+                                  </p:childTnLst>
+                                </p:cTn>
+                              </p:par>
+                              <p:par>
+                                <p:cTn id="83" presetID="1" presetClass="entr" presetSubtype="0" fill="hold" grpId="0" nodeType="withEffect">
+                                  <p:stCondLst>
+                                    <p:cond delay="0"/>
+                                  </p:stCondLst>
+                                  <p:childTnLst>
+                                    <p:set>
+                                      <p:cBhvr>
+                                        <p:cTn id="84" dur="1" fill="hold">
+                                          <p:stCondLst>
+                                            <p:cond delay="0"/>
+                                          </p:stCondLst>
+                                        </p:cTn>
+                                        <p:tgtEl>
+                                          <p:spTgt spid="97"/>
+                                        </p:tgtEl>
+                                        <p:attrNameLst>
+                                          <p:attrName>style.visibility</p:attrName>
+                                        </p:attrNameLst>
+                                      </p:cBhvr>
+                                      <p:to>
+                                        <p:strVal val="visible"/>
+                                      </p:to>
+                                    </p:set>
+                                  </p:childTnLst>
+                                </p:cTn>
+                              </p:par>
+                              <p:par>
+                                <p:cTn id="85" presetID="1" presetClass="entr" presetSubtype="0" fill="hold" grpId="0" nodeType="withEffect">
+                                  <p:stCondLst>
+                                    <p:cond delay="0"/>
+                                  </p:stCondLst>
+                                  <p:childTnLst>
+                                    <p:set>
+                                      <p:cBhvr>
+                                        <p:cTn id="86" dur="1" fill="hold">
+                                          <p:stCondLst>
+                                            <p:cond delay="0"/>
+                                          </p:stCondLst>
+                                        </p:cTn>
+                                        <p:tgtEl>
+                                          <p:spTgt spid="103"/>
+                                        </p:tgtEl>
+                                        <p:attrNameLst>
+                                          <p:attrName>style.visibility</p:attrName>
+                                        </p:attrNameLst>
+                                      </p:cBhvr>
+                                      <p:to>
+                                        <p:strVal val="visible"/>
+                                      </p:to>
+                                    </p:set>
+                                  </p:childTnLst>
+                                </p:cTn>
+                              </p:par>
+                              <p:par>
+                                <p:cTn id="87" presetID="1" presetClass="entr" presetSubtype="0" fill="hold" nodeType="withEffect">
+                                  <p:stCondLst>
+                                    <p:cond delay="0"/>
+                                  </p:stCondLst>
+                                  <p:childTnLst>
+                                    <p:set>
+                                      <p:cBhvr>
+                                        <p:cTn id="88" dur="1" fill="hold">
+                                          <p:stCondLst>
+                                            <p:cond delay="0"/>
+                                          </p:stCondLst>
+                                        </p:cTn>
+                                        <p:tgtEl>
+                                          <p:spTgt spid="104"/>
+                                        </p:tgtEl>
+                                        <p:attrNameLst>
+                                          <p:attrName>style.visibility</p:attrName>
+                                        </p:attrNameLst>
+                                      </p:cBhvr>
+                                      <p:to>
+                                        <p:strVal val="visible"/>
+                                      </p:to>
+                                    </p:set>
+                                  </p:childTnLst>
+                                </p:cTn>
+                              </p:par>
+                              <p:par>
+                                <p:cTn id="89" presetID="1" presetClass="entr" presetSubtype="0" fill="hold" grpId="0" nodeType="withEffect">
+                                  <p:stCondLst>
+                                    <p:cond delay="0"/>
+                                  </p:stCondLst>
+                                  <p:childTnLst>
+                                    <p:set>
+                                      <p:cBhvr>
+                                        <p:cTn id="90" dur="1" fill="hold">
+                                          <p:stCondLst>
+                                            <p:cond delay="0"/>
+                                          </p:stCondLst>
+                                        </p:cTn>
+                                        <p:tgtEl>
+                                          <p:spTgt spid="105"/>
+                                        </p:tgtEl>
+                                        <p:attrNameLst>
+                                          <p:attrName>style.visibility</p:attrName>
+                                        </p:attrNameLst>
+                                      </p:cBhvr>
+                                      <p:to>
+                                        <p:strVal val="visible"/>
+                                      </p:to>
+                                    </p:set>
+                                  </p:childTnLst>
+                                </p:cTn>
+                              </p:par>
+                              <p:par>
+                                <p:cTn id="91" presetID="1" presetClass="entr" presetSubtype="0" fill="hold" grpId="0" nodeType="withEffect">
+                                  <p:stCondLst>
+                                    <p:cond delay="0"/>
+                                  </p:stCondLst>
+                                  <p:childTnLst>
+                                    <p:set>
+                                      <p:cBhvr>
+                                        <p:cTn id="92" dur="1" fill="hold">
+                                          <p:stCondLst>
+                                            <p:cond delay="0"/>
+                                          </p:stCondLst>
+                                        </p:cTn>
+                                        <p:tgtEl>
+                                          <p:spTgt spid="106"/>
+                                        </p:tgtEl>
+                                        <p:attrNameLst>
+                                          <p:attrName>style.visibility</p:attrName>
+                                        </p:attrNameLst>
+                                      </p:cBhvr>
+                                      <p:to>
+                                        <p:strVal val="visible"/>
+                                      </p:to>
+                                    </p:set>
+                                  </p:childTnLst>
+                                </p:cTn>
+                              </p:par>
+                              <p:par>
+                                <p:cTn id="93" presetID="1" presetClass="entr" presetSubtype="0" fill="hold" nodeType="withEffect">
+                                  <p:stCondLst>
+                                    <p:cond delay="0"/>
+                                  </p:stCondLst>
+                                  <p:childTnLst>
+                                    <p:set>
+                                      <p:cBhvr>
+                                        <p:cTn id="94" dur="1" fill="hold">
+                                          <p:stCondLst>
+                                            <p:cond delay="0"/>
+                                          </p:stCondLst>
+                                        </p:cTn>
+                                        <p:tgtEl>
+                                          <p:spTgt spid="107"/>
                                         </p:tgtEl>
                                         <p:attrNameLst>
                                           <p:attrName>style.visibility</p:attrName>
@@ -8366,32 +9356,32 @@
                     </p:cTn>
                   </p:par>
                   <p:par>
-                    <p:cTn id="81" fill="hold">
+                    <p:cTn id="95" fill="hold">
                       <p:stCondLst>
                         <p:cond delay="indefinite"/>
                       </p:stCondLst>
                       <p:childTnLst>
                         <p:par>
-                          <p:cTn id="82" fill="hold">
+                          <p:cTn id="96" fill="hold">
                             <p:stCondLst>
                               <p:cond delay="0"/>
                             </p:stCondLst>
                             <p:childTnLst>
                               <p:par>
-                                <p:cTn id="83" presetID="1" presetClass="entr" presetSubtype="0" fill="hold" grpId="0" nodeType="clickEffect">
+                                <p:cTn id="97" presetID="1" presetClass="entr" presetSubtype="0" fill="hold" grpId="0" nodeType="clickEffect">
                                   <p:stCondLst>
                                     <p:cond delay="0"/>
                                   </p:stCondLst>
                                   <p:childTnLst>
                                     <p:set>
                                       <p:cBhvr>
-                                        <p:cTn id="84" dur="1" fill="hold">
+                                        <p:cTn id="98" dur="1" fill="hold">
                                           <p:stCondLst>
                                             <p:cond delay="0"/>
                                           </p:stCondLst>
                                         </p:cTn>
                                         <p:tgtEl>
-                                          <p:spTgt spid="64"/>
+                                          <p:spTgt spid="117"/>
                                         </p:tgtEl>
                                         <p:attrNameLst>
                                           <p:attrName>style.visibility</p:attrName>
@@ -8405,20 +9395,263 @@
                                 </p:cTn>
                               </p:par>
                               <p:par>
-                                <p:cTn id="85" presetID="1" presetClass="entr" presetSubtype="0" fill="hold" nodeType="withEffect">
+                                <p:cTn id="99" presetID="1" presetClass="entr" presetSubtype="0" fill="hold" grpId="0" nodeType="withEffect">
                                   <p:stCondLst>
                                     <p:cond delay="0"/>
                                   </p:stCondLst>
                                   <p:childTnLst>
                                     <p:set>
                                       <p:cBhvr>
-                                        <p:cTn id="86" dur="1" fill="hold">
+                                        <p:cTn id="100" dur="1" fill="hold">
                                           <p:stCondLst>
                                             <p:cond delay="0"/>
                                           </p:stCondLst>
                                         </p:cTn>
                                         <p:tgtEl>
-                                          <p:spTgt spid="63"/>
+                                          <p:spTgt spid="116"/>
+                                        </p:tgtEl>
+                                        <p:attrNameLst>
+                                          <p:attrName>style.visibility</p:attrName>
+                                        </p:attrNameLst>
+                                      </p:cBhvr>
+                                      <p:to>
+                                        <p:strVal val="visible"/>
+                                      </p:to>
+                                    </p:set>
+                                  </p:childTnLst>
+                                </p:cTn>
+                              </p:par>
+                              <p:par>
+                                <p:cTn id="101" presetID="1" presetClass="entr" presetSubtype="0" fill="hold" nodeType="withEffect">
+                                  <p:stCondLst>
+                                    <p:cond delay="0"/>
+                                  </p:stCondLst>
+                                  <p:childTnLst>
+                                    <p:set>
+                                      <p:cBhvr>
+                                        <p:cTn id="102" dur="1" fill="hold">
+                                          <p:stCondLst>
+                                            <p:cond delay="0"/>
+                                          </p:stCondLst>
+                                        </p:cTn>
+                                        <p:tgtEl>
+                                          <p:spTgt spid="118"/>
+                                        </p:tgtEl>
+                                        <p:attrNameLst>
+                                          <p:attrName>style.visibility</p:attrName>
+                                        </p:attrNameLst>
+                                      </p:cBhvr>
+                                      <p:to>
+                                        <p:strVal val="visible"/>
+                                      </p:to>
+                                    </p:set>
+                                  </p:childTnLst>
+                                </p:cTn>
+                              </p:par>
+                              <p:par>
+                                <p:cTn id="103" presetID="1" presetClass="entr" presetSubtype="0" fill="hold" grpId="0" nodeType="withEffect">
+                                  <p:stCondLst>
+                                    <p:cond delay="0"/>
+                                  </p:stCondLst>
+                                  <p:childTnLst>
+                                    <p:set>
+                                      <p:cBhvr>
+                                        <p:cTn id="104" dur="1" fill="hold">
+                                          <p:stCondLst>
+                                            <p:cond delay="0"/>
+                                          </p:stCondLst>
+                                        </p:cTn>
+                                        <p:tgtEl>
+                                          <p:spTgt spid="119"/>
+                                        </p:tgtEl>
+                                        <p:attrNameLst>
+                                          <p:attrName>style.visibility</p:attrName>
+                                        </p:attrNameLst>
+                                      </p:cBhvr>
+                                      <p:to>
+                                        <p:strVal val="visible"/>
+                                      </p:to>
+                                    </p:set>
+                                  </p:childTnLst>
+                                </p:cTn>
+                              </p:par>
+                              <p:par>
+                                <p:cTn id="105" presetID="1" presetClass="entr" presetSubtype="0" fill="hold" nodeType="withEffect">
+                                  <p:stCondLst>
+                                    <p:cond delay="0"/>
+                                  </p:stCondLst>
+                                  <p:childTnLst>
+                                    <p:set>
+                                      <p:cBhvr>
+                                        <p:cTn id="106" dur="1" fill="hold">
+                                          <p:stCondLst>
+                                            <p:cond delay="0"/>
+                                          </p:stCondLst>
+                                        </p:cTn>
+                                        <p:tgtEl>
+                                          <p:spTgt spid="120"/>
+                                        </p:tgtEl>
+                                        <p:attrNameLst>
+                                          <p:attrName>style.visibility</p:attrName>
+                                        </p:attrNameLst>
+                                      </p:cBhvr>
+                                      <p:to>
+                                        <p:strVal val="visible"/>
+                                      </p:to>
+                                    </p:set>
+                                  </p:childTnLst>
+                                </p:cTn>
+                              </p:par>
+                              <p:par>
+                                <p:cTn id="107" presetID="1" presetClass="entr" presetSubtype="0" fill="hold" grpId="0" nodeType="withEffect">
+                                  <p:stCondLst>
+                                    <p:cond delay="0"/>
+                                  </p:stCondLst>
+                                  <p:childTnLst>
+                                    <p:set>
+                                      <p:cBhvr>
+                                        <p:cTn id="108" dur="1" fill="hold">
+                                          <p:stCondLst>
+                                            <p:cond delay="0"/>
+                                          </p:stCondLst>
+                                        </p:cTn>
+                                        <p:tgtEl>
+                                          <p:spTgt spid="121"/>
+                                        </p:tgtEl>
+                                        <p:attrNameLst>
+                                          <p:attrName>style.visibility</p:attrName>
+                                        </p:attrNameLst>
+                                      </p:cBhvr>
+                                      <p:to>
+                                        <p:strVal val="visible"/>
+                                      </p:to>
+                                    </p:set>
+                                  </p:childTnLst>
+                                </p:cTn>
+                              </p:par>
+                              <p:par>
+                                <p:cTn id="109" presetID="1" presetClass="entr" presetSubtype="0" fill="hold" nodeType="withEffect">
+                                  <p:stCondLst>
+                                    <p:cond delay="0"/>
+                                  </p:stCondLst>
+                                  <p:childTnLst>
+                                    <p:set>
+                                      <p:cBhvr>
+                                        <p:cTn id="110" dur="1" fill="hold">
+                                          <p:stCondLst>
+                                            <p:cond delay="0"/>
+                                          </p:stCondLst>
+                                        </p:cTn>
+                                        <p:tgtEl>
+                                          <p:spTgt spid="122"/>
+                                        </p:tgtEl>
+                                        <p:attrNameLst>
+                                          <p:attrName>style.visibility</p:attrName>
+                                        </p:attrNameLst>
+                                      </p:cBhvr>
+                                      <p:to>
+                                        <p:strVal val="visible"/>
+                                      </p:to>
+                                    </p:set>
+                                  </p:childTnLst>
+                                </p:cTn>
+                              </p:par>
+                              <p:par>
+                                <p:cTn id="111" presetID="1" presetClass="entr" presetSubtype="0" fill="hold" grpId="0" nodeType="withEffect">
+                                  <p:stCondLst>
+                                    <p:cond delay="0"/>
+                                  </p:stCondLst>
+                                  <p:childTnLst>
+                                    <p:set>
+                                      <p:cBhvr>
+                                        <p:cTn id="112" dur="1" fill="hold">
+                                          <p:stCondLst>
+                                            <p:cond delay="0"/>
+                                          </p:stCondLst>
+                                        </p:cTn>
+                                        <p:tgtEl>
+                                          <p:spTgt spid="123"/>
+                                        </p:tgtEl>
+                                        <p:attrNameLst>
+                                          <p:attrName>style.visibility</p:attrName>
+                                        </p:attrNameLst>
+                                      </p:cBhvr>
+                                      <p:to>
+                                        <p:strVal val="visible"/>
+                                      </p:to>
+                                    </p:set>
+                                  </p:childTnLst>
+                                </p:cTn>
+                              </p:par>
+                              <p:par>
+                                <p:cTn id="113" presetID="1" presetClass="entr" presetSubtype="0" fill="hold" nodeType="withEffect">
+                                  <p:stCondLst>
+                                    <p:cond delay="0"/>
+                                  </p:stCondLst>
+                                  <p:childTnLst>
+                                    <p:set>
+                                      <p:cBhvr>
+                                        <p:cTn id="114" dur="1" fill="hold">
+                                          <p:stCondLst>
+                                            <p:cond delay="0"/>
+                                          </p:stCondLst>
+                                        </p:cTn>
+                                        <p:tgtEl>
+                                          <p:spTgt spid="124"/>
+                                        </p:tgtEl>
+                                        <p:attrNameLst>
+                                          <p:attrName>style.visibility</p:attrName>
+                                        </p:attrNameLst>
+                                      </p:cBhvr>
+                                      <p:to>
+                                        <p:strVal val="visible"/>
+                                      </p:to>
+                                    </p:set>
+                                  </p:childTnLst>
+                                </p:cTn>
+                              </p:par>
+                              <p:par>
+                                <p:cTn id="115" presetID="1" presetClass="entr" presetSubtype="0" fill="hold" grpId="0" nodeType="withEffect">
+                                  <p:stCondLst>
+                                    <p:cond delay="0"/>
+                                  </p:stCondLst>
+                                  <p:childTnLst>
+                                    <p:set>
+                                      <p:cBhvr>
+                                        <p:cTn id="116" dur="1" fill="hold">
+                                          <p:stCondLst>
+                                            <p:cond delay="0"/>
+                                          </p:stCondLst>
+                                        </p:cTn>
+                                        <p:tgtEl>
+                                          <p:spTgt spid="137"/>
+                                        </p:tgtEl>
+                                        <p:attrNameLst>
+                                          <p:attrName>style.visibility</p:attrName>
+                                        </p:attrNameLst>
+                                      </p:cBhvr>
+                                      <p:to>
+                                        <p:strVal val="visible"/>
+                                      </p:to>
+                                    </p:set>
+                                  </p:childTnLst>
+                                </p:cTn>
+                              </p:par>
+                              <p:par>
+                                <p:cTn id="117" presetID="1" presetClass="entr" presetSubtype="0" fill="hold" grpId="0" nodeType="withEffect">
+                                  <p:stCondLst>
+                                    <p:cond delay="0"/>
+                                  </p:stCondLst>
+                                  <p:childTnLst>
+                                    <p:set>
+                                      <p:cBhvr>
+                                        <p:cTn id="118" dur="1" fill="hold">
+                                          <p:stCondLst>
+                                            <p:cond delay="0"/>
+                                          </p:stCondLst>
+                                        </p:cTn>
+                                        <p:tgtEl>
+                                          <p:spTgt spid="139"/>
                                         </p:tgtEl>
                                         <p:attrNameLst>
                                           <p:attrName>style.visibility</p:attrName>
@@ -8465,21 +9698,33 @@
       <p:bldP spid="16" grpId="0" animBg="1"/>
       <p:bldP spid="19" grpId="0"/>
       <p:bldP spid="21" grpId="0" animBg="1"/>
-      <p:bldP spid="23" grpId="0"/>
       <p:bldP spid="32" grpId="0"/>
       <p:bldP spid="35" grpId="0" animBg="1"/>
-      <p:bldP spid="37" grpId="0"/>
-      <p:bldP spid="42" grpId="0"/>
-      <p:bldP spid="46" grpId="0" animBg="1"/>
-      <p:bldP spid="49" grpId="0"/>
       <p:bldP spid="50" grpId="0" animBg="1"/>
-      <p:bldP spid="52" grpId="0"/>
-      <p:bldP spid="54" grpId="0"/>
       <p:bldP spid="57" grpId="0" animBg="1"/>
-      <p:bldP spid="59" grpId="0"/>
-      <p:bldP spid="61" grpId="0"/>
       <p:bldP spid="64" grpId="0"/>
       <p:bldP spid="73" grpId="0" animBg="1"/>
+      <p:bldP spid="65" grpId="0"/>
+      <p:bldP spid="71" grpId="0"/>
+      <p:bldP spid="76" grpId="0" animBg="1"/>
+      <p:bldP spid="78" grpId="0"/>
+      <p:bldP spid="79" grpId="0"/>
+      <p:bldP spid="85" grpId="0"/>
+      <p:bldP spid="87" grpId="0"/>
+      <p:bldP spid="88" grpId="0"/>
+      <p:bldP spid="94" grpId="0"/>
+      <p:bldP spid="95" grpId="0" animBg="1"/>
+      <p:bldP spid="97" grpId="0"/>
+      <p:bldP spid="103" grpId="0" animBg="1"/>
+      <p:bldP spid="105" grpId="0"/>
+      <p:bldP spid="106" grpId="0"/>
+      <p:bldP spid="116" grpId="0" animBg="1"/>
+      <p:bldP spid="117" grpId="0" animBg="1"/>
+      <p:bldP spid="119" grpId="0"/>
+      <p:bldP spid="121" grpId="0" animBg="1"/>
+      <p:bldP spid="123" grpId="0"/>
+      <p:bldP spid="137" grpId="0"/>
+      <p:bldP spid="139" grpId="0"/>
     </p:bldLst>
   </p:timing>
 </p:sld>
@@ -9781,13 +11026,13 @@
   <p:clrMapOvr>
     <a:masterClrMapping/>
   </p:clrMapOvr>
-  <mc:AlternateContent xmlns:mc="http://schemas.openxmlformats.org/markup-compatibility/2006">
-    <mc:Choice xmlns:p14="http://schemas.microsoft.com/office/powerpoint/2010/main" Requires="p14">
+  <mc:AlternateContent xmlns:mc="http://schemas.openxmlformats.org/markup-compatibility/2006" xmlns:p14="http://schemas.microsoft.com/office/powerpoint/2010/main">
+    <mc:Choice Requires="p14">
       <p:transition>
         <p14:reveal/>
       </p:transition>
     </mc:Choice>
-    <mc:Fallback>
+    <mc:Fallback xmlns="">
       <p:transition>
         <p:fade/>
       </p:transition>
@@ -10000,13 +11245,13 @@
   <p:clrMapOvr>
     <a:masterClrMapping/>
   </p:clrMapOvr>
-  <mc:AlternateContent xmlns:mc="http://schemas.openxmlformats.org/markup-compatibility/2006">
-    <mc:Choice xmlns:p14="http://schemas.microsoft.com/office/powerpoint/2010/main" Requires="p14">
+  <mc:AlternateContent xmlns:mc="http://schemas.openxmlformats.org/markup-compatibility/2006" xmlns:p14="http://schemas.microsoft.com/office/powerpoint/2010/main">
+    <mc:Choice Requires="p14">
       <p:transition>
         <p14:reveal/>
       </p:transition>
     </mc:Choice>
-    <mc:Fallback>
+    <mc:Fallback xmlns="">
       <p:transition>
         <p:fade/>
       </p:transition>
@@ -11495,13 +12740,13 @@
   <p:clrMapOvr>
     <a:masterClrMapping/>
   </p:clrMapOvr>
-  <mc:AlternateContent xmlns:mc="http://schemas.openxmlformats.org/markup-compatibility/2006">
-    <mc:Choice xmlns:p14="http://schemas.microsoft.com/office/powerpoint/2010/main" Requires="p14">
+  <mc:AlternateContent xmlns:mc="http://schemas.openxmlformats.org/markup-compatibility/2006" xmlns:p14="http://schemas.microsoft.com/office/powerpoint/2010/main">
+    <mc:Choice Requires="p14">
       <p:transition>
         <p14:reveal/>
       </p:transition>
     </mc:Choice>
-    <mc:Fallback>
+    <mc:Fallback xmlns="">
       <p:transition>
         <p:fade/>
       </p:transition>
@@ -11762,13 +13007,13 @@
   <p:clrMapOvr>
     <a:masterClrMapping/>
   </p:clrMapOvr>
-  <mc:AlternateContent xmlns:mc="http://schemas.openxmlformats.org/markup-compatibility/2006">
-    <mc:Choice xmlns:p14="http://schemas.microsoft.com/office/powerpoint/2010/main" Requires="p14">
+  <mc:AlternateContent xmlns:mc="http://schemas.openxmlformats.org/markup-compatibility/2006" xmlns:p14="http://schemas.microsoft.com/office/powerpoint/2010/main">
+    <mc:Choice Requires="p14">
       <p:transition>
         <p14:reveal/>
       </p:transition>
     </mc:Choice>
-    <mc:Fallback>
+    <mc:Fallback xmlns="">
       <p:transition>
         <p:fade/>
       </p:transition>
@@ -12102,13 +13347,13 @@
   <p:clrMapOvr>
     <a:masterClrMapping/>
   </p:clrMapOvr>
-  <mc:AlternateContent xmlns:mc="http://schemas.openxmlformats.org/markup-compatibility/2006">
-    <mc:Choice xmlns:p14="http://schemas.microsoft.com/office/powerpoint/2010/main" Requires="p14">
+  <mc:AlternateContent xmlns:mc="http://schemas.openxmlformats.org/markup-compatibility/2006" xmlns:p14="http://schemas.microsoft.com/office/powerpoint/2010/main">
+    <mc:Choice Requires="p14">
       <p:transition>
         <p14:reveal/>
       </p:transition>
     </mc:Choice>
-    <mc:Fallback>
+    <mc:Fallback xmlns="">
       <p:transition>
         <p:fade/>
       </p:transition>
@@ -12453,13 +13698,13 @@
   <p:clrMapOvr>
     <a:masterClrMapping/>
   </p:clrMapOvr>
-  <mc:AlternateContent xmlns:mc="http://schemas.openxmlformats.org/markup-compatibility/2006">
-    <mc:Choice xmlns:p14="http://schemas.microsoft.com/office/powerpoint/2010/main" Requires="p14">
+  <mc:AlternateContent xmlns:mc="http://schemas.openxmlformats.org/markup-compatibility/2006" xmlns:p14="http://schemas.microsoft.com/office/powerpoint/2010/main">
+    <mc:Choice Requires="p14">
       <p:transition>
         <p14:reveal/>
       </p:transition>
     </mc:Choice>
-    <mc:Fallback>
+    <mc:Fallback xmlns="">
       <p:transition>
         <p:fade/>
       </p:transition>
@@ -13069,13 +14314,13 @@
   <p:clrMapOvr>
     <a:masterClrMapping/>
   </p:clrMapOvr>
-  <mc:AlternateContent xmlns:mc="http://schemas.openxmlformats.org/markup-compatibility/2006">
-    <mc:Choice xmlns:p14="http://schemas.microsoft.com/office/powerpoint/2010/main" Requires="p14">
+  <mc:AlternateContent xmlns:mc="http://schemas.openxmlformats.org/markup-compatibility/2006" xmlns:p14="http://schemas.microsoft.com/office/powerpoint/2010/main">
+    <mc:Choice Requires="p14">
       <p:transition>
         <p14:reveal/>
       </p:transition>
     </mc:Choice>
-    <mc:Fallback>
+    <mc:Fallback xmlns="">
       <p:transition>
         <p:fade/>
       </p:transition>
@@ -13968,13 +15213,13 @@
   <p:clrMapOvr>
     <a:masterClrMapping/>
   </p:clrMapOvr>
-  <mc:AlternateContent xmlns:mc="http://schemas.openxmlformats.org/markup-compatibility/2006">
-    <mc:Choice xmlns:p14="http://schemas.microsoft.com/office/powerpoint/2010/main" Requires="p14">
+  <mc:AlternateContent xmlns:mc="http://schemas.openxmlformats.org/markup-compatibility/2006" xmlns:p14="http://schemas.microsoft.com/office/powerpoint/2010/main">
+    <mc:Choice Requires="p14">
       <p:transition>
         <p14:reveal/>
       </p:transition>
     </mc:Choice>
-    <mc:Fallback>
+    <mc:Fallback xmlns="">
       <p:transition>
         <p:fade/>
       </p:transition>
@@ -14166,13 +15411,13 @@
   <p:clrMapOvr>
     <a:masterClrMapping/>
   </p:clrMapOvr>
-  <mc:AlternateContent xmlns:mc="http://schemas.openxmlformats.org/markup-compatibility/2006">
-    <mc:Choice xmlns:p14="http://schemas.microsoft.com/office/powerpoint/2010/main" Requires="p14">
+  <mc:AlternateContent xmlns:mc="http://schemas.openxmlformats.org/markup-compatibility/2006" xmlns:p14="http://schemas.microsoft.com/office/powerpoint/2010/main">
+    <mc:Choice Requires="p14">
       <p:transition>
         <p14:reveal/>
       </p:transition>
     </mc:Choice>
-    <mc:Fallback>
+    <mc:Fallback xmlns="">
       <p:transition>
         <p:fade/>
       </p:transition>

</xml_diff>